<commit_message>
Update RAG Demo Presentation.pptx
</commit_message>
<xml_diff>
--- a/RAG Demo Presentation.pptx
+++ b/RAG Demo Presentation.pptx
@@ -5,27 +5,28 @@
     <p:sldMasterId id="2147483648" r:id="rId4"/>
   </p:sldMasterIdLst>
   <p:notesMasterIdLst>
-    <p:notesMasterId r:id="rId20"/>
+    <p:notesMasterId r:id="rId21"/>
   </p:notesMasterIdLst>
   <p:handoutMasterIdLst>
-    <p:handoutMasterId r:id="rId21"/>
+    <p:handoutMasterId r:id="rId22"/>
   </p:handoutMasterIdLst>
   <p:sldIdLst>
     <p:sldId id="256" r:id="rId5"/>
     <p:sldId id="257" r:id="rId6"/>
     <p:sldId id="279" r:id="rId7"/>
     <p:sldId id="258" r:id="rId8"/>
-    <p:sldId id="280" r:id="rId9"/>
-    <p:sldId id="281" r:id="rId10"/>
-    <p:sldId id="292" r:id="rId11"/>
-    <p:sldId id="287" r:id="rId12"/>
-    <p:sldId id="286" r:id="rId13"/>
-    <p:sldId id="284" r:id="rId14"/>
-    <p:sldId id="291" r:id="rId15"/>
-    <p:sldId id="290" r:id="rId16"/>
-    <p:sldId id="289" r:id="rId17"/>
-    <p:sldId id="288" r:id="rId18"/>
-    <p:sldId id="271" r:id="rId19"/>
+    <p:sldId id="293" r:id="rId9"/>
+    <p:sldId id="280" r:id="rId10"/>
+    <p:sldId id="281" r:id="rId11"/>
+    <p:sldId id="292" r:id="rId12"/>
+    <p:sldId id="287" r:id="rId13"/>
+    <p:sldId id="286" r:id="rId14"/>
+    <p:sldId id="284" r:id="rId15"/>
+    <p:sldId id="291" r:id="rId16"/>
+    <p:sldId id="290" r:id="rId17"/>
+    <p:sldId id="289" r:id="rId18"/>
+    <p:sldId id="288" r:id="rId19"/>
+    <p:sldId id="271" r:id="rId20"/>
   </p:sldIdLst>
   <p:sldSz cx="12192000" cy="6858000"/>
   <p:notesSz cx="6858000" cy="9144000"/>
@@ -138,7 +139,8 @@
 <file path=ppt/revisionInfo.xml><?xml version="1.0" encoding="utf-8"?>
 <p1510:revInfo xmlns:a="http://schemas.openxmlformats.org/drawingml/2006/main" xmlns:r="http://schemas.openxmlformats.org/officeDocument/2006/relationships" xmlns:p1510="http://schemas.microsoft.com/office/powerpoint/2015/10/main">
   <p1510:revLst>
-    <p1510:client id="{AD80370F-A5F0-41DF-B6BD-3EE92B939027}" v="433" dt="2024-04-23T06:08:25.763"/>
+    <p1510:client id="{AD80370F-A5F0-41DF-B6BD-3EE92B939027}" v="489" dt="2024-04-24T18:46:29.811"/>
+    <p1510:client id="{C4400D97-62BF-4A77-AB38-82BD9B4D0AE7}" v="1" dt="2024-04-26T15:19:00.910"/>
   </p1510:revLst>
 </p1510:revInfo>
 </file>
@@ -237,7 +239,7 @@
           <a:p>
             <a:fld id="{B56F32FC-4BD9-442A-A8C6-51598C909FE3}" type="datetimeFigureOut">
               <a:rPr lang="en-US" smtClean="0"/>
-              <a:t>4/22/2024</a:t>
+              <a:t>4/26/2024</a:t>
             </a:fld>
             <a:endParaRPr lang="en-US" dirty="0"/>
           </a:p>
@@ -414,7 +416,7 @@
           <a:p>
             <a:fld id="{056371FA-A98D-41E8-93F4-09945841298A}" type="datetimeFigureOut">
               <a:rPr lang="en-US" smtClean="0"/>
-              <a:t>4/22/2024</a:t>
+              <a:t>4/26/2024</a:t>
             </a:fld>
             <a:endParaRPr lang="en-US" dirty="0"/>
           </a:p>
@@ -725,7 +727,10 @@
           <a:bodyPr/>
           <a:lstStyle/>
           <a:p>
-            <a:endParaRPr lang="en-US" dirty="0"/>
+            <a:r>
+              <a:rPr lang="en-US" dirty="0"/>
+              <a:t>Hi everyone, and welcome to my presentation on Retrieval-Augmented Generation, also known as RAG. Today, we'll delve into this exciting new approach in AI text generation and explore how it overcomes some of the limitations of traditional methods. By the end of this presentation, you'll gain a solid understanding of RAG's core principles, its benefits, and how it's transforming the landscape of AI-powered text creation.</a:t>
+            </a:r>
           </a:p>
         </p:txBody>
       </p:sp>
@@ -839,7 +844,7 @@
     </p:spTree>
     <p:extLst>
       <p:ext uri="{BB962C8B-B14F-4D97-AF65-F5344CB8AC3E}">
-        <p14:creationId xmlns:p14="http://schemas.microsoft.com/office/powerpoint/2010/main" val="4008116521"/>
+        <p14:creationId xmlns:p14="http://schemas.microsoft.com/office/powerpoint/2010/main" val="575465472"/>
       </p:ext>
     </p:extLst>
   </p:cSld>
@@ -893,82 +898,7 @@
           <a:bodyPr/>
           <a:lstStyle/>
           <a:p>
-            <a:pPr marL="171450" indent="-171450">
-              <a:buFont typeface="Arial"/>
-              <a:buChar char="•"/>
-            </a:pPr>
-            <a:r>
-              <a:rPr lang="en-US" dirty="0"/>
-              <a:t>Explain the process of preparing the data for the RAG application.</a:t>
-            </a:r>
-          </a:p>
-          <a:p>
-            <a:pPr marL="171450" indent="-171450">
-              <a:buFont typeface="Arial"/>
-              <a:buChar char="•"/>
-            </a:pPr>
-            <a:r>
-              <a:rPr lang="en-US" dirty="0"/>
-              <a:t>Discuss loading and splitting the text into chunks to create a dataset.</a:t>
-            </a:r>
-            <a:endParaRPr lang="en-US" dirty="0">
-              <a:ea typeface="Calibri"/>
-              <a:cs typeface="Calibri"/>
-            </a:endParaRPr>
-          </a:p>
-          <a:p>
-            <a:pPr>
-              <a:buFont typeface="Arial"/>
-              <a:buChar char="•"/>
-            </a:pPr>
-            <a:r>
-              <a:rPr lang="en-US" dirty="0"/>
-              <a:t>Mention the importance of organizing the data and ensuring it is in a suitable format for processing.</a:t>
-            </a:r>
-            <a:br>
-              <a:rPr lang="en-US" dirty="0">
-                <a:cs typeface="+mn-lt"/>
-              </a:rPr>
-            </a:br>
-            <a:br>
-              <a:rPr lang="en-US" dirty="0">
-                <a:cs typeface="+mn-lt"/>
-              </a:rPr>
-            </a:br>
-            <a:r>
-              <a:rPr lang="en-US" dirty="0"/>
-              <a:t>Use document loaders to load data from a source as Document's. A Document is a piece of text and associated metadata. For example, there are document loaders for loading a simple .txt file, for loading the text contents of any web page, or even for loading a transcript of a YouTube video.</a:t>
-            </a:r>
-            <a:endParaRPr lang="en-US" dirty="0">
-              <a:ea typeface="Calibri"/>
-              <a:cs typeface="Calibri"/>
-            </a:endParaRPr>
-          </a:p>
-          <a:p>
-            <a:pPr>
-              <a:buFont typeface="Arial"/>
-              <a:buChar char="•"/>
-            </a:pPr>
-            <a:r>
-              <a:rPr lang="en-US"/>
-              <a:t>Document loaders provide a "load" method for loading data as documents from a configured source. They optionally implement a "lazy load" as well for lazily loading data into memory.</a:t>
-            </a:r>
-          </a:p>
-          <a:p>
-            <a:pPr marL="171450" indent="-171450">
-              <a:buFont typeface="Arial"/>
-              <a:buChar char="•"/>
-            </a:pPr>
-            <a:br>
-              <a:rPr lang="en-US" dirty="0"/>
-            </a:br>
             <a:endParaRPr lang="en-US" dirty="0"/>
-          </a:p>
-          <a:p>
-            <a:endParaRPr lang="en-US" dirty="0">
-              <a:ea typeface="Calibri"/>
-              <a:cs typeface="Calibri"/>
-            </a:endParaRPr>
           </a:p>
         </p:txBody>
       </p:sp>
@@ -989,7 +919,7 @@
           <a:p>
             <a:fld id="{22289C57-55D7-40A4-A101-E74FAC7A092B}" type="slidenum">
               <a:rPr lang="en-US" smtClean="0"/>
-              <a:t>11</a:t>
+              <a:t>12</a:t>
             </a:fld>
             <a:endParaRPr lang="en-US" dirty="0"/>
           </a:p>
@@ -998,7 +928,7 @@
     </p:spTree>
     <p:extLst>
       <p:ext uri="{BB962C8B-B14F-4D97-AF65-F5344CB8AC3E}">
-        <p14:creationId xmlns:p14="http://schemas.microsoft.com/office/powerpoint/2010/main" val="356894014"/>
+        <p14:creationId xmlns:p14="http://schemas.microsoft.com/office/powerpoint/2010/main" val="4008116521"/>
       </p:ext>
     </p:extLst>
   </p:cSld>
@@ -1058,7 +988,7 @@
             </a:pPr>
             <a:r>
               <a:rPr lang="en-US" dirty="0"/>
-              <a:t>Describe the steps involved in creating a Chroma database from the text chunks.</a:t>
+              <a:t>Explain the process of preparing the data for the RAG application.</a:t>
             </a:r>
           </a:p>
           <a:p>
@@ -1068,7 +998,7 @@
             </a:pPr>
             <a:r>
               <a:rPr lang="en-US" dirty="0"/>
-              <a:t>Explain the use of vector embeddings generated by OpenAI to represent the text data in the database.</a:t>
+              <a:t>Discuss loading and splitting the text into chunks to create a dataset.</a:t>
             </a:r>
             <a:endParaRPr lang="en-US" dirty="0">
               <a:ea typeface="Calibri"/>
@@ -1076,25 +1006,59 @@
             </a:endParaRPr>
           </a:p>
           <a:p>
+            <a:pPr>
+              <a:buFont typeface="Arial"/>
+              <a:buChar char="•"/>
+            </a:pPr>
+            <a:r>
+              <a:rPr lang="en-US" dirty="0"/>
+              <a:t>Mention the importance of organizing the data and ensuring it is in a suitable format for processing.</a:t>
+            </a:r>
+            <a:br>
+              <a:rPr lang="en-US" dirty="0">
+                <a:cs typeface="+mn-lt"/>
+              </a:rPr>
+            </a:br>
+            <a:br>
+              <a:rPr lang="en-US" dirty="0">
+                <a:cs typeface="+mn-lt"/>
+              </a:rPr>
+            </a:br>
+            <a:r>
+              <a:rPr lang="en-US" dirty="0"/>
+              <a:t>Use document loaders to load data from a source as Document's. A Document is a piece of text and associated metadata. For example, there are document loaders for loading a simple .txt file, for loading the text contents of any web page, or even for loading a transcript of a YouTube video.</a:t>
+            </a:r>
+            <a:endParaRPr lang="en-US" dirty="0">
+              <a:ea typeface="Calibri"/>
+              <a:cs typeface="Calibri"/>
+            </a:endParaRPr>
+          </a:p>
+          <a:p>
+            <a:pPr>
+              <a:buFont typeface="Arial"/>
+              <a:buChar char="•"/>
+            </a:pPr>
+            <a:r>
+              <a:rPr lang="en-US"/>
+              <a:t>Document loaders provide a "load" method for loading data as documents from a configured source. They optionally implement a "lazy load" as well for lazily loading data into memory.</a:t>
+            </a:r>
+          </a:p>
+          <a:p>
             <a:pPr marL="171450" indent="-171450">
               <a:buFont typeface="Arial"/>
               <a:buChar char="•"/>
             </a:pPr>
-            <a:r>
-              <a:rPr lang="en-US" dirty="0"/>
-              <a:t>Highlight the significance of the Chroma database in enabling efficient retrieval of relevant information for text generation.</a:t>
-            </a:r>
+            <a:br>
+              <a:rPr lang="en-US" dirty="0"/>
+            </a:br>
+            <a:endParaRPr lang="en-US" dirty="0"/>
+          </a:p>
+          <a:p>
             <a:endParaRPr lang="en-US" dirty="0">
               <a:ea typeface="Calibri"/>
               <a:cs typeface="Calibri"/>
             </a:endParaRPr>
           </a:p>
-          <a:p>
-            <a:endParaRPr lang="en-US" dirty="0">
-              <a:ea typeface="Calibri"/>
-              <a:cs typeface="Calibri"/>
-            </a:endParaRPr>
-          </a:p>
         </p:txBody>
       </p:sp>
       <p:sp>
@@ -1114,7 +1078,7 @@
           <a:p>
             <a:fld id="{22289C57-55D7-40A4-A101-E74FAC7A092B}" type="slidenum">
               <a:rPr lang="en-US" smtClean="0"/>
-              <a:t>11</a:t>
+              <a:t>13</a:t>
             </a:fld>
             <a:endParaRPr lang="en-US" dirty="0"/>
           </a:p>
@@ -1123,7 +1087,7 @@
     </p:spTree>
     <p:extLst>
       <p:ext uri="{BB962C8B-B14F-4D97-AF65-F5344CB8AC3E}">
-        <p14:creationId xmlns:p14="http://schemas.microsoft.com/office/powerpoint/2010/main" val="1348947653"/>
+        <p14:creationId xmlns:p14="http://schemas.microsoft.com/office/powerpoint/2010/main" val="356894014"/>
       </p:ext>
     </p:extLst>
   </p:cSld>
@@ -1182,8 +1146,8 @@
               <a:buChar char="•"/>
             </a:pPr>
             <a:r>
-              <a:rPr lang="en-US"/>
-              <a:t>escribe the steps involved in creating a Chroma database from the text chunks.</a:t>
+              <a:rPr lang="en-US" dirty="0"/>
+              <a:t>Describe the steps involved in creating a Chroma database from the text chunks.</a:t>
             </a:r>
           </a:p>
           <a:p>
@@ -1192,9 +1156,13 @@
               <a:buChar char="•"/>
             </a:pPr>
             <a:r>
-              <a:rPr lang="en-US"/>
+              <a:rPr lang="en-US" dirty="0"/>
               <a:t>Explain the use of vector embeddings generated by OpenAI to represent the text data in the database.</a:t>
             </a:r>
+            <a:endParaRPr lang="en-US" dirty="0">
+              <a:ea typeface="Calibri"/>
+              <a:cs typeface="Calibri"/>
+            </a:endParaRPr>
           </a:p>
           <a:p>
             <a:pPr marL="171450" indent="-171450">
@@ -1202,18 +1170,8 @@
               <a:buChar char="•"/>
             </a:pPr>
             <a:r>
-              <a:rPr lang="en-US"/>
+              <a:rPr lang="en-US" dirty="0"/>
               <a:t>Highlight the significance of the Chroma database in enabling efficient retrieval of relevant information for text generation.</a:t>
-            </a:r>
-          </a:p>
-          <a:p>
-            <a:pPr marL="171450" indent="-171450">
-              <a:buFont typeface="Arial"/>
-              <a:buChar char="•"/>
-            </a:pPr>
-            <a:r>
-              <a:rPr lang="en-US" dirty="0"/>
-              <a:t>Explain how to query the Chroma database for relevant data based on user queries.</a:t>
             </a:r>
             <a:endParaRPr lang="en-US" dirty="0">
               <a:ea typeface="Calibri"/>
@@ -1221,39 +1179,11 @@
             </a:endParaRPr>
           </a:p>
           <a:p>
-            <a:pPr marL="171450" indent="-171450">
-              <a:buFont typeface="Arial"/>
-              <a:buChar char="•"/>
-            </a:pPr>
-            <a:r>
-              <a:rPr lang="en-US" dirty="0"/>
-              <a:t>Discuss the use of embedding similarity to identify and retrieve text chunks that match the query.</a:t>
-            </a:r>
             <a:endParaRPr lang="en-US" dirty="0">
               <a:ea typeface="Calibri"/>
               <a:cs typeface="Calibri"/>
             </a:endParaRPr>
           </a:p>
-          <a:p>
-            <a:pPr marL="171450" indent="-171450">
-              <a:buFont typeface="Arial"/>
-              <a:buChar char="•"/>
-            </a:pPr>
-            <a:r>
-              <a:rPr lang="en-US" dirty="0"/>
-              <a:t>Provide examples of queries and the corresponding retrieved data from the database.</a:t>
-            </a:r>
-            <a:endParaRPr lang="en-US" dirty="0">
-              <a:ea typeface="Calibri"/>
-              <a:cs typeface="Calibri"/>
-            </a:endParaRPr>
-          </a:p>
-          <a:p>
-            <a:endParaRPr lang="en-US" dirty="0">
-              <a:ea typeface="Calibri"/>
-              <a:cs typeface="Calibri"/>
-            </a:endParaRPr>
-          </a:p>
         </p:txBody>
       </p:sp>
       <p:sp>
@@ -1273,7 +1203,7 @@
           <a:p>
             <a:fld id="{22289C57-55D7-40A4-A101-E74FAC7A092B}" type="slidenum">
               <a:rPr lang="en-US" smtClean="0"/>
-              <a:t>11</a:t>
+              <a:t>14</a:t>
             </a:fld>
             <a:endParaRPr lang="en-US" dirty="0"/>
           </a:p>
@@ -1282,7 +1212,7 @@
     </p:spTree>
     <p:extLst>
       <p:ext uri="{BB962C8B-B14F-4D97-AF65-F5344CB8AC3E}">
-        <p14:creationId xmlns:p14="http://schemas.microsoft.com/office/powerpoint/2010/main" val="3081428285"/>
+        <p14:creationId xmlns:p14="http://schemas.microsoft.com/office/powerpoint/2010/main" val="1348947653"/>
       </p:ext>
     </p:extLst>
   </p:cSld>
@@ -1336,7 +1266,90 @@
           <a:bodyPr/>
           <a:lstStyle/>
           <a:p>
-            <a:endParaRPr lang="en-US" dirty="0"/>
+            <a:pPr marL="171450" indent="-171450">
+              <a:buFont typeface="Arial"/>
+              <a:buChar char="•"/>
+            </a:pPr>
+            <a:r>
+              <a:rPr lang="en-US" dirty="0"/>
+              <a:t>Describe the steps involved in creating a Chroma database from the text chunks.</a:t>
+            </a:r>
+          </a:p>
+          <a:p>
+            <a:pPr marL="171450" indent="-171450">
+              <a:buFont typeface="Arial"/>
+              <a:buChar char="•"/>
+            </a:pPr>
+            <a:r>
+              <a:rPr lang="en-US" dirty="0"/>
+              <a:t>Explain the use of vector embeddings generated by OpenAI to represent the text data in the database.</a:t>
+            </a:r>
+            <a:endParaRPr lang="en-US" dirty="0">
+              <a:ea typeface="Calibri"/>
+              <a:cs typeface="Calibri"/>
+            </a:endParaRPr>
+          </a:p>
+          <a:p>
+            <a:pPr marL="171450" indent="-171450">
+              <a:buFont typeface="Arial"/>
+              <a:buChar char="•"/>
+            </a:pPr>
+            <a:r>
+              <a:rPr lang="en-US" dirty="0"/>
+              <a:t>Highlight the significance of the Chroma database in enabling efficient retrieval of relevant information for text generation.</a:t>
+            </a:r>
+            <a:endParaRPr lang="en-US" dirty="0">
+              <a:ea typeface="Calibri"/>
+              <a:cs typeface="Calibri"/>
+            </a:endParaRPr>
+          </a:p>
+          <a:p>
+            <a:pPr marL="171450" indent="-171450">
+              <a:buFont typeface="Arial"/>
+              <a:buChar char="•"/>
+            </a:pPr>
+            <a:r>
+              <a:rPr lang="en-US" dirty="0"/>
+              <a:t>Explain how to query the Chroma database for relevant data based on user queries.</a:t>
+            </a:r>
+            <a:endParaRPr lang="en-US" dirty="0">
+              <a:ea typeface="Calibri"/>
+              <a:cs typeface="Calibri"/>
+            </a:endParaRPr>
+          </a:p>
+          <a:p>
+            <a:pPr marL="171450" indent="-171450">
+              <a:buFont typeface="Arial"/>
+              <a:buChar char="•"/>
+            </a:pPr>
+            <a:r>
+              <a:rPr lang="en-US" dirty="0"/>
+              <a:t>Discuss the use of embedding similarity to identify and retrieve text chunks that match the query.</a:t>
+            </a:r>
+            <a:endParaRPr lang="en-US" dirty="0">
+              <a:ea typeface="Calibri"/>
+              <a:cs typeface="Calibri"/>
+            </a:endParaRPr>
+          </a:p>
+          <a:p>
+            <a:pPr marL="171450" indent="-171450">
+              <a:buFont typeface="Arial"/>
+              <a:buChar char="•"/>
+            </a:pPr>
+            <a:r>
+              <a:rPr lang="en-US" dirty="0"/>
+              <a:t>Provide examples of queries and the corresponding retrieved data from the database.</a:t>
+            </a:r>
+            <a:endParaRPr lang="en-US" dirty="0">
+              <a:ea typeface="Calibri"/>
+              <a:cs typeface="Calibri"/>
+            </a:endParaRPr>
+          </a:p>
+          <a:p>
+            <a:endParaRPr lang="en-US" dirty="0">
+              <a:ea typeface="Calibri"/>
+              <a:cs typeface="Calibri"/>
+            </a:endParaRPr>
           </a:p>
         </p:txBody>
       </p:sp>
@@ -1357,7 +1370,91 @@
           <a:p>
             <a:fld id="{22289C57-55D7-40A4-A101-E74FAC7A092B}" type="slidenum">
               <a:rPr lang="en-US" smtClean="0"/>
-              <a:t>13</a:t>
+              <a:t>15</a:t>
+            </a:fld>
+            <a:endParaRPr lang="en-US" dirty="0"/>
+          </a:p>
+        </p:txBody>
+      </p:sp>
+    </p:spTree>
+    <p:extLst>
+      <p:ext uri="{BB962C8B-B14F-4D97-AF65-F5344CB8AC3E}">
+        <p14:creationId xmlns:p14="http://schemas.microsoft.com/office/powerpoint/2010/main" val="3081428285"/>
+      </p:ext>
+    </p:extLst>
+  </p:cSld>
+  <p:clrMapOvr>
+    <a:masterClrMapping/>
+  </p:clrMapOvr>
+</p:notes>
+</file>
+
+<file path=ppt/notesSlides/notesSlide15.xml><?xml version="1.0" encoding="utf-8"?>
+<p:notes xmlns:a="http://schemas.openxmlformats.org/drawingml/2006/main" xmlns:r="http://schemas.openxmlformats.org/officeDocument/2006/relationships" xmlns:p="http://schemas.openxmlformats.org/presentationml/2006/main">
+  <p:cSld>
+    <p:spTree>
+      <p:nvGrpSpPr>
+        <p:cNvPr id="1" name=""/>
+        <p:cNvGrpSpPr/>
+        <p:nvPr/>
+      </p:nvGrpSpPr>
+      <p:grpSpPr>
+        <a:xfrm>
+          <a:off x="0" y="0"/>
+          <a:ext cx="0" cy="0"/>
+          <a:chOff x="0" y="0"/>
+          <a:chExt cx="0" cy="0"/>
+        </a:xfrm>
+      </p:grpSpPr>
+      <p:sp>
+        <p:nvSpPr>
+          <p:cNvPr id="2" name="Slide Image Placeholder 1"/>
+          <p:cNvSpPr>
+            <a:spLocks noGrp="1" noRot="1" noChangeAspect="1"/>
+          </p:cNvSpPr>
+          <p:nvPr>
+            <p:ph type="sldImg"/>
+          </p:nvPr>
+        </p:nvSpPr>
+        <p:spPr/>
+      </p:sp>
+      <p:sp>
+        <p:nvSpPr>
+          <p:cNvPr id="3" name="Notes Placeholder 2"/>
+          <p:cNvSpPr>
+            <a:spLocks noGrp="1"/>
+          </p:cNvSpPr>
+          <p:nvPr>
+            <p:ph type="body" idx="1"/>
+          </p:nvPr>
+        </p:nvSpPr>
+        <p:spPr/>
+        <p:txBody>
+          <a:bodyPr/>
+          <a:lstStyle/>
+          <a:p>
+            <a:endParaRPr lang="en-US" dirty="0"/>
+          </a:p>
+        </p:txBody>
+      </p:sp>
+      <p:sp>
+        <p:nvSpPr>
+          <p:cNvPr id="4" name="Slide Number Placeholder 3"/>
+          <p:cNvSpPr>
+            <a:spLocks noGrp="1"/>
+          </p:cNvSpPr>
+          <p:nvPr>
+            <p:ph type="sldNum" sz="quarter" idx="5"/>
+          </p:nvPr>
+        </p:nvSpPr>
+        <p:spPr/>
+        <p:txBody>
+          <a:bodyPr/>
+          <a:lstStyle/>
+          <a:p>
+            <a:fld id="{22289C57-55D7-40A4-A101-E74FAC7A092B}" type="slidenum">
+              <a:rPr lang="en-US" smtClean="0"/>
+              <a:t>16</a:t>
             </a:fld>
             <a:endParaRPr lang="en-US" dirty="0"/>
           </a:p>
@@ -1525,7 +1622,7 @@
           <a:p>
             <a:fld id="{22289C57-55D7-40A4-A101-E74FAC7A092B}" type="slidenum">
               <a:rPr lang="en-US" smtClean="0"/>
-              <a:t>4</a:t>
+              <a:t>3</a:t>
             </a:fld>
             <a:endParaRPr lang="en-US" dirty="0"/>
           </a:p>
@@ -1593,6 +1690,18 @@
               <a:t>Before diving into RAG, let's take a quick detour to understand the broader landscape of Artificial Intelligence (AI). AI is a branch of computer science focused on creating intelligent machines that can mimic human cognitive functions like learning and problem-solving. We see AI applications in various fields, from robots that assemble complex machinery on factory floors to self-driving cars navigating busy streets. Even medical diagnosis and the personalized recommendations you see on online shopping platforms leverage the power of AI. To achieve these feats, AI relies on several key components:</a:t>
             </a:r>
           </a:p>
+          <a:p>
+            <a:endParaRPr lang="en-US" dirty="0">
+              <a:ea typeface="Calibri"/>
+              <a:cs typeface="Calibri"/>
+            </a:endParaRPr>
+          </a:p>
+          <a:p>
+            <a:endParaRPr lang="en-US" dirty="0">
+              <a:ea typeface="Calibri"/>
+              <a:cs typeface="Calibri"/>
+            </a:endParaRPr>
+          </a:p>
         </p:txBody>
       </p:sp>
       <p:sp>
@@ -1612,7 +1721,7 @@
           <a:p>
             <a:fld id="{22289C57-55D7-40A4-A101-E74FAC7A092B}" type="slidenum">
               <a:rPr lang="en-US" smtClean="0"/>
-              <a:t>5</a:t>
+              <a:t>4</a:t>
             </a:fld>
             <a:endParaRPr lang="en-US" dirty="0"/>
           </a:p>
@@ -1847,18 +1956,38 @@
           <a:lstStyle/>
           <a:p>
             <a:r>
-              <a:rPr lang="en-US"/>
-              <a:t>RAG offers several distinct advantages over traditional LLMs. First and foremost, it tackles the issue of factual accuracy. By leveraging external knowledge sources, RAG ensures the generated text aligns with real-world information, reducing the chances of nonsensical or misleading content. Additionally, RAG promotes coherence and focus in the generated text. The retrieved information acts as a guide, keeping the model on track and producing content that stays true to the user's prompt. Finally, RAG boasts impressive adaptability. By incorporating domain-specific knowledge sources , RAG can be fine-tuned to generate highly specialized and accurate text content within a particular field.</a:t>
-            </a:r>
-          </a:p>
-          <a:p>
-            <a:pPr marL="171450" indent="-171450">
-              <a:buFont typeface="Arial"/>
-              <a:buChar char="•"/>
+              <a:rPr lang="en-US" b="1" dirty="0"/>
+              <a:t>Indexing</a:t>
+            </a:r>
+            <a:r>
+              <a:rPr lang="en-US" b="1" dirty="0">
+                <a:hlinkClick r:id="rId3"/>
+              </a:rPr>
+              <a:t> </a:t>
+            </a:r>
+            <a:endParaRPr lang="en-US"/>
+          </a:p>
+          <a:p>
+            <a:pPr marL="285750" indent="-285750">
+              <a:buAutoNum type="arabicPeriod"/>
             </a:pPr>
             <a:r>
-              <a:rPr lang="en-US" dirty="0"/>
-              <a:t>Enhances Relevance: RAG improves the relevance of generated text by incorporating information retrieved from external sources, ensuring that responses are contextually appropriate and accurate.</a:t>
+              <a:rPr lang="en-US" b="1" dirty="0"/>
+              <a:t>Load</a:t>
+            </a:r>
+            <a:r>
+              <a:rPr lang="en-US" dirty="0"/>
+              <a:t>: First we need to load our data. This is done with </a:t>
+            </a:r>
+            <a:r>
+              <a:rPr lang="en-US" dirty="0">
+                <a:hlinkClick r:id="rId4"/>
+              </a:rPr>
+              <a:t>DocumentLoaders</a:t>
+            </a:r>
+            <a:r>
+              <a:rPr lang="en-US" dirty="0"/>
+              <a:t>.</a:t>
             </a:r>
             <a:endParaRPr lang="en-US" dirty="0">
               <a:ea typeface="Calibri"/>
@@ -1866,13 +1995,26 @@
             </a:endParaRPr>
           </a:p>
           <a:p>
-            <a:pPr marL="171450" indent="-171450">
-              <a:buFont typeface="Arial"/>
-              <a:buChar char="•"/>
+            <a:pPr marL="285750" indent="-285750">
+              <a:buAutoNum type="arabicPeriod"/>
             </a:pPr>
             <a:r>
-              <a:rPr lang="en-US" dirty="0"/>
-              <a:t>Increases Accuracy: By leveraging external knowledge sources, RAG reduces the likelihood of generating incorrect or irrelevant responses, resulting in higher accuracy in language generation tasks.</a:t>
+              <a:rPr lang="en-US" b="1" dirty="0"/>
+              <a:t>Split</a:t>
+            </a:r>
+            <a:r>
+              <a:rPr lang="en-US" dirty="0"/>
+              <a:t>: </a:t>
+            </a:r>
+            <a:r>
+              <a:rPr lang="en-US" dirty="0">
+                <a:hlinkClick r:id="rId5"/>
+              </a:rPr>
+              <a:t>Text splitters</a:t>
+            </a:r>
+            <a:r>
+              <a:rPr lang="en-US" dirty="0"/>
+              <a:t> break large Documents into smaller chunks. This is useful both for indexing data and for passing it in to a model, since large chunks are harder to search over and won’t fit in a model’s finite context window.</a:t>
             </a:r>
             <a:endParaRPr lang="en-US" dirty="0">
               <a:ea typeface="Calibri"/>
@@ -1880,13 +2022,36 @@
             </a:endParaRPr>
           </a:p>
           <a:p>
-            <a:pPr marL="171450" indent="-171450">
-              <a:buFont typeface="Arial"/>
-              <a:buChar char="•"/>
+            <a:pPr marL="285750" indent="-285750">
+              <a:buAutoNum type="arabicPeriod"/>
             </a:pPr>
             <a:r>
-              <a:rPr lang="en-US" dirty="0"/>
-              <a:t>Expands Knowledge Coverage: RAG allows AI models to access and utilize vast amounts of external information, expanding their knowledge coverage beyond what is contained in their training data.</a:t>
+              <a:rPr lang="en-US" b="1" dirty="0"/>
+              <a:t>Store</a:t>
+            </a:r>
+            <a:r>
+              <a:rPr lang="en-US" dirty="0"/>
+              <a:t>: We need somewhere to store and index our splits, so that they can later be searched over. This is often done using a </a:t>
+            </a:r>
+            <a:r>
+              <a:rPr lang="en-US" dirty="0">
+                <a:hlinkClick r:id="rId6"/>
+              </a:rPr>
+              <a:t>VectorStore</a:t>
+            </a:r>
+            <a:r>
+              <a:rPr lang="en-US" dirty="0"/>
+              <a:t> and </a:t>
+            </a:r>
+            <a:r>
+              <a:rPr lang="en-US" dirty="0">
+                <a:hlinkClick r:id="rId7"/>
+              </a:rPr>
+              <a:t>Embeddings</a:t>
+            </a:r>
+            <a:r>
+              <a:rPr lang="en-US" dirty="0"/>
+              <a:t> model.</a:t>
             </a:r>
             <a:endParaRPr lang="en-US" dirty="0">
               <a:ea typeface="Calibri"/>
@@ -1894,13 +2059,33 @@
             </a:endParaRPr>
           </a:p>
           <a:p>
-            <a:pPr marL="171450" indent="-171450">
-              <a:buFont typeface="Arial"/>
-              <a:buChar char="•"/>
+            <a:pPr marL="285750" indent="-285750">
+              <a:buAutoNum type="arabicPeriod"/>
             </a:pPr>
             <a:r>
-              <a:rPr lang="en-US" dirty="0"/>
-              <a:t>Enables Dynamic Responses: RAG enables dynamic responses that adapt to specific queries or contexts by retrieving and incorporating up-to-date information from external sources.</a:t>
+              <a:rPr lang="en-US" b="1" err="1">
+                <a:ea typeface="Calibri"/>
+                <a:cs typeface="Calibri"/>
+              </a:rPr>
+              <a:t>VectorStore</a:t>
+            </a:r>
+            <a:r>
+              <a:rPr lang="en-US" b="1" dirty="0">
+                <a:ea typeface="Calibri"/>
+                <a:cs typeface="Calibri"/>
+              </a:rPr>
+              <a:t> </a:t>
+            </a:r>
+            <a:r>
+              <a:rPr lang="en-US" dirty="0">
+                <a:ea typeface="Calibri"/>
+                <a:cs typeface="Calibri"/>
+              </a:rPr>
+              <a:t>: </a:t>
+            </a:r>
+            <a:r>
+              <a:rPr lang="en-US" dirty="0"/>
+              <a:t>One of the most common ways to store and search over unstructured data is to embed it and store the resulting embedding vectors, and then at query time to embed the unstructured query and retrieve the embedding vectors that are 'most similar' to the embedded query. A vector store takes care of storing embedded data and performing vector search for you.</a:t>
             </a:r>
             <a:endParaRPr lang="en-US" dirty="0">
               <a:ea typeface="Calibri"/>
@@ -1908,13 +2093,139 @@
             </a:endParaRPr>
           </a:p>
           <a:p>
+            <a:pPr marL="285750" indent="-285750">
+              <a:buAutoNum type="arabicPeriod"/>
+            </a:pPr>
+            <a:r>
+              <a:rPr lang="en-US" b="1" dirty="0">
+                <a:ea typeface="Calibri"/>
+                <a:cs typeface="Calibri"/>
+              </a:rPr>
+              <a:t>Embedding </a:t>
+            </a:r>
+            <a:r>
+              <a:rPr lang="en-US" dirty="0">
+                <a:ea typeface="Calibri"/>
+                <a:cs typeface="Calibri"/>
+              </a:rPr>
+              <a:t>: </a:t>
+            </a:r>
+            <a:r>
+              <a:rPr lang="en-US" dirty="0"/>
+              <a:t>Embeddings create a vector representation of a piece of text. This is useful because it means we can think about text in the vector space, and do things like semantic search where we look for pieces of text that are most similar in the vector space.</a:t>
+            </a:r>
+            <a:endParaRPr lang="en-US" dirty="0">
+              <a:ea typeface="Calibri"/>
+              <a:cs typeface="Calibri"/>
+            </a:endParaRPr>
+          </a:p>
+          <a:p>
+            <a:r>
+              <a:rPr lang="en-US" dirty="0"/>
+              <a:t> The base Embeddings class in </a:t>
+            </a:r>
+            <a:r>
+              <a:rPr lang="en-US" dirty="0" err="1"/>
+              <a:t>LangChain</a:t>
+            </a:r>
+            <a:r>
+              <a:rPr lang="en-US" dirty="0"/>
+              <a:t> provides two methods: one for embedding documents and one for embedding a query. The former takes as input multiple texts, while the latter takes a single text. The reason for having these as two separate methods is that some embedding providers have different embedding methods for documents (to be searched over) vs queries (the search query itself).</a:t>
+            </a:r>
+            <a:endParaRPr lang="en-US" dirty="0">
+              <a:ea typeface="Calibri"/>
+              <a:cs typeface="Calibri"/>
+            </a:endParaRPr>
+          </a:p>
+          <a:p>
+            <a:pPr marL="285750" indent="-285750">
+              <a:buAutoNum type="arabicPeriod"/>
+            </a:pPr>
+            <a:endParaRPr lang="en-US" dirty="0">
+              <a:ea typeface="Calibri"/>
+              <a:cs typeface="Calibri"/>
+            </a:endParaRPr>
+          </a:p>
+          <a:p>
+            <a:pPr marL="285750" indent="-285750">
+              <a:buAutoNum type="arabicPeriod"/>
+            </a:pPr>
+            <a:endParaRPr lang="en-US" dirty="0">
+              <a:ea typeface="Calibri"/>
+              <a:cs typeface="Calibri"/>
+            </a:endParaRPr>
+          </a:p>
+          <a:p>
+            <a:r>
+              <a:rPr lang="en-US" b="1" dirty="0"/>
+              <a:t>Retrieval and generation</a:t>
+            </a:r>
+            <a:r>
+              <a:rPr lang="en-US" b="1" dirty="0">
+                <a:hlinkClick r:id="rId8"/>
+              </a:rPr>
+              <a:t> </a:t>
+            </a:r>
+            <a:endParaRPr lang="en-US"/>
+          </a:p>
+          <a:p>
             <a:pPr marL="171450" indent="-171450">
-              <a:buFont typeface="Arial"/>
-              <a:buChar char="•"/>
+              <a:buAutoNum type="arabicPeriod"/>
             </a:pPr>
             <a:r>
-              <a:rPr lang="en-US" dirty="0"/>
-              <a:t>Enhances User Interaction: With RAG, AI systems can provide more informative and engaging interactions by delivering richer, more contextually relevant responses that meet user needs more effectively.</a:t>
+              <a:rPr lang="en-US" b="1" dirty="0"/>
+              <a:t>Retrieve</a:t>
+            </a:r>
+            <a:r>
+              <a:rPr lang="en-US" dirty="0"/>
+              <a:t>: Given a user input, relevant splits are retrieved from storage using a </a:t>
+            </a:r>
+            <a:r>
+              <a:rPr lang="en-US" dirty="0">
+                <a:hlinkClick r:id="rId9"/>
+              </a:rPr>
+              <a:t>Retriever</a:t>
+            </a:r>
+            <a:r>
+              <a:rPr lang="en-US" dirty="0"/>
+              <a:t>.</a:t>
+            </a:r>
+            <a:endParaRPr lang="en-US" dirty="0">
+              <a:ea typeface="Calibri" panose="020F0502020204030204"/>
+              <a:cs typeface="Calibri" panose="020F0502020204030204"/>
+            </a:endParaRPr>
+          </a:p>
+          <a:p>
+            <a:pPr marL="171450" indent="-171450">
+              <a:buAutoNum type="arabicPeriod"/>
+            </a:pPr>
+            <a:r>
+              <a:rPr lang="en-US" b="1" dirty="0"/>
+              <a:t>Generate</a:t>
+            </a:r>
+            <a:r>
+              <a:rPr lang="en-US" dirty="0"/>
+              <a:t>: A </a:t>
+            </a:r>
+            <a:r>
+              <a:rPr lang="en-US" dirty="0">
+                <a:hlinkClick r:id="rId10"/>
+              </a:rPr>
+              <a:t>ChatModel</a:t>
+            </a:r>
+            <a:r>
+              <a:rPr lang="en-US" dirty="0"/>
+              <a:t> / </a:t>
+            </a:r>
+            <a:r>
+              <a:rPr lang="en-US" dirty="0">
+                <a:hlinkClick r:id="rId11"/>
+              </a:rPr>
+              <a:t>LLM</a:t>
+            </a:r>
+            <a:r>
+              <a:rPr lang="en-US" dirty="0"/>
+              <a:t> produces an answer using a prompt that includes the question and the retrieved data</a:t>
             </a:r>
             <a:endParaRPr lang="en-US" dirty="0">
               <a:ea typeface="Calibri"/>
@@ -1955,7 +2266,7 @@
     </p:spTree>
     <p:extLst>
       <p:ext uri="{BB962C8B-B14F-4D97-AF65-F5344CB8AC3E}">
-        <p14:creationId xmlns:p14="http://schemas.microsoft.com/office/powerpoint/2010/main" val="1843579195"/>
+        <p14:creationId xmlns:p14="http://schemas.microsoft.com/office/powerpoint/2010/main" val="1910621065"/>
       </p:ext>
     </p:extLst>
   </p:cSld>
@@ -2009,7 +2320,86 @@
           <a:bodyPr/>
           <a:lstStyle/>
           <a:p>
-            <a:endParaRPr lang="en-US" dirty="0"/>
+            <a:r>
+              <a:rPr lang="en-US"/>
+              <a:t>RAG offers several distinct advantages over traditional LLMs. First and foremost, it tackles the issue of factual accuracy. By leveraging external knowledge sources, RAG ensures the generated text aligns with real-world information, reducing the chances of nonsensical or misleading content. Additionally, RAG promotes coherence and focus in the generated text. The retrieved information acts as a guide, keeping the model on track and producing content that stays true to the user's prompt. Finally, RAG boasts impressive adaptability. By incorporating domain-specific knowledge sources , RAG can be fine-tuned to generate highly specialized and accurate text content within a particular field.</a:t>
+            </a:r>
+          </a:p>
+          <a:p>
+            <a:pPr marL="171450" indent="-171450">
+              <a:buFont typeface="Arial"/>
+              <a:buChar char="•"/>
+            </a:pPr>
+            <a:r>
+              <a:rPr lang="en-US" dirty="0"/>
+              <a:t>Enhances Relevance: RAG improves the relevance of generated text by incorporating information retrieved from external sources, ensuring that responses are contextually appropriate and accurate.</a:t>
+            </a:r>
+            <a:endParaRPr lang="en-US" dirty="0">
+              <a:ea typeface="Calibri"/>
+              <a:cs typeface="Calibri"/>
+            </a:endParaRPr>
+          </a:p>
+          <a:p>
+            <a:pPr marL="171450" indent="-171450">
+              <a:buFont typeface="Arial"/>
+              <a:buChar char="•"/>
+            </a:pPr>
+            <a:r>
+              <a:rPr lang="en-US" dirty="0"/>
+              <a:t>Increases Accuracy: By leveraging external knowledge sources, RAG reduces the likelihood of generating incorrect or irrelevant responses, resulting in higher accuracy in language generation tasks.</a:t>
+            </a:r>
+            <a:endParaRPr lang="en-US" dirty="0">
+              <a:ea typeface="Calibri"/>
+              <a:cs typeface="Calibri"/>
+            </a:endParaRPr>
+          </a:p>
+          <a:p>
+            <a:pPr marL="171450" indent="-171450">
+              <a:buFont typeface="Arial"/>
+              <a:buChar char="•"/>
+            </a:pPr>
+            <a:r>
+              <a:rPr lang="en-US" dirty="0"/>
+              <a:t>Expands Knowledge Coverage: RAG allows AI models to access and utilize vast amounts of external information, expanding their knowledge coverage beyond what is contained in their training data.</a:t>
+            </a:r>
+            <a:endParaRPr lang="en-US" dirty="0">
+              <a:ea typeface="Calibri"/>
+              <a:cs typeface="Calibri"/>
+            </a:endParaRPr>
+          </a:p>
+          <a:p>
+            <a:pPr marL="171450" indent="-171450">
+              <a:buFont typeface="Arial"/>
+              <a:buChar char="•"/>
+            </a:pPr>
+            <a:r>
+              <a:rPr lang="en-US" dirty="0"/>
+              <a:t>Enables Dynamic Responses: RAG enables dynamic responses that adapt to specific queries or contexts by retrieving and incorporating up-to-date information from external sources.</a:t>
+            </a:r>
+            <a:endParaRPr lang="en-US" dirty="0">
+              <a:ea typeface="Calibri"/>
+              <a:cs typeface="Calibri"/>
+            </a:endParaRPr>
+          </a:p>
+          <a:p>
+            <a:pPr marL="171450" indent="-171450">
+              <a:buFont typeface="Arial"/>
+              <a:buChar char="•"/>
+            </a:pPr>
+            <a:r>
+              <a:rPr lang="en-US" dirty="0"/>
+              <a:t>Enhances User Interaction: With RAG, AI systems can provide more informative and engaging interactions by delivering richer, more contextually relevant responses that meet user needs more effectively.</a:t>
+            </a:r>
+            <a:endParaRPr lang="en-US" dirty="0">
+              <a:ea typeface="Calibri"/>
+              <a:cs typeface="Calibri"/>
+            </a:endParaRPr>
+          </a:p>
+          <a:p>
+            <a:endParaRPr lang="en-US" dirty="0">
+              <a:ea typeface="Calibri"/>
+              <a:cs typeface="Calibri"/>
+            </a:endParaRPr>
           </a:p>
         </p:txBody>
       </p:sp>
@@ -2030,7 +2420,7 @@
           <a:p>
             <a:fld id="{22289C57-55D7-40A4-A101-E74FAC7A092B}" type="slidenum">
               <a:rPr lang="en-US" smtClean="0"/>
-              <a:t>5</a:t>
+              <a:t>9</a:t>
             </a:fld>
             <a:endParaRPr lang="en-US" dirty="0"/>
           </a:p>
@@ -2039,7 +2429,7 @@
     </p:spTree>
     <p:extLst>
       <p:ext uri="{BB962C8B-B14F-4D97-AF65-F5344CB8AC3E}">
-        <p14:creationId xmlns:p14="http://schemas.microsoft.com/office/powerpoint/2010/main" val="1133226369"/>
+        <p14:creationId xmlns:p14="http://schemas.microsoft.com/office/powerpoint/2010/main" val="1843579195"/>
       </p:ext>
     </p:extLst>
   </p:cSld>
@@ -2114,7 +2504,7 @@
           <a:p>
             <a:fld id="{22289C57-55D7-40A4-A101-E74FAC7A092B}" type="slidenum">
               <a:rPr lang="en-US" smtClean="0"/>
-              <a:t>11</a:t>
+              <a:t>10</a:t>
             </a:fld>
             <a:endParaRPr lang="en-US" dirty="0"/>
           </a:p>
@@ -2123,7 +2513,7 @@
     </p:spTree>
     <p:extLst>
       <p:ext uri="{BB962C8B-B14F-4D97-AF65-F5344CB8AC3E}">
-        <p14:creationId xmlns:p14="http://schemas.microsoft.com/office/powerpoint/2010/main" val="575465472"/>
+        <p14:creationId xmlns:p14="http://schemas.microsoft.com/office/powerpoint/2010/main" val="1133226369"/>
       </p:ext>
     </p:extLst>
   </p:cSld>
@@ -7620,191 +8010,105 @@
       </p:grpSpPr>
       <p:sp>
         <p:nvSpPr>
-          <p:cNvPr id="9" name="Slide Number Placeholder 8">
-            <a:extLst>
-              <a:ext uri="{FF2B5EF4-FFF2-40B4-BE49-F238E27FC236}">
-                <a16:creationId xmlns:a16="http://schemas.microsoft.com/office/drawing/2014/main" id="{C396FFDC-ADE8-4009-A466-A81787258E88}"/>
-              </a:ext>
-            </a:extLst>
-          </p:cNvPr>
-          <p:cNvSpPr>
-            <a:spLocks noGrp="1"/>
-          </p:cNvSpPr>
-          <p:nvPr>
-            <p:ph type="sldNum" sz="quarter" idx="12"/>
-          </p:nvPr>
-        </p:nvSpPr>
-        <p:spPr>
-          <a:xfrm>
-            <a:off x="8610600" y="6356350"/>
-            <a:ext cx="2743200" cy="365125"/>
+          <p:cNvPr id="2" name="Title 1">
+            <a:extLst>
+              <a:ext uri="{FF2B5EF4-FFF2-40B4-BE49-F238E27FC236}">
+                <a16:creationId xmlns:a16="http://schemas.microsoft.com/office/drawing/2014/main" id="{818AFA5E-469B-2BFC-9D4E-BD1EC6E48CA0}"/>
+              </a:ext>
+            </a:extLst>
+          </p:cNvPr>
+          <p:cNvSpPr>
+            <a:spLocks noGrp="1"/>
+          </p:cNvSpPr>
+          <p:nvPr>
+            <p:ph type="ctrTitle"/>
+          </p:nvPr>
+        </p:nvSpPr>
+        <p:spPr>
+          <a:xfrm>
+            <a:off x="6991350" y="487680"/>
+            <a:ext cx="4179570" cy="3376691"/>
           </a:xfrm>
         </p:spPr>
         <p:txBody>
           <a:bodyPr/>
           <a:lstStyle/>
           <a:p>
-            <a:fld id="{A49DFD55-3C28-40EF-9E31-A92D2E4017FF}" type="slidenum">
-              <a:rPr lang="en-US" smtClean="0"/>
-              <a:pPr/>
-              <a:t>10</a:t>
-            </a:fld>
-            <a:endParaRPr lang="en-US" dirty="0"/>
-          </a:p>
-        </p:txBody>
-      </p:sp>
-      <p:sp>
-        <p:nvSpPr>
-          <p:cNvPr id="13" name="Title 1">
-            <a:extLst>
-              <a:ext uri="{FF2B5EF4-FFF2-40B4-BE49-F238E27FC236}">
-                <a16:creationId xmlns:a16="http://schemas.microsoft.com/office/drawing/2014/main" id="{1DA7F7F3-5771-6E73-62C6-D2CBD438E955}"/>
-              </a:ext>
-            </a:extLst>
-          </p:cNvPr>
-          <p:cNvSpPr>
-            <a:spLocks noGrp="1"/>
-          </p:cNvSpPr>
-          <p:nvPr>
-            <p:ph type="title"/>
-          </p:nvPr>
-        </p:nvSpPr>
-        <p:spPr>
-          <a:xfrm>
-            <a:off x="1341120" y="558801"/>
-            <a:ext cx="9953308" cy="1780860"/>
-          </a:xfrm>
-        </p:spPr>
-        <p:txBody>
-          <a:bodyPr/>
-          <a:lstStyle/>
-          <a:p>
-            <a:r>
-              <a:rPr lang="en-US"/>
-              <a:t>DEMO OVERVIEW</a:t>
-            </a:r>
-          </a:p>
-        </p:txBody>
-      </p:sp>
-      <p:sp>
-        <p:nvSpPr>
-          <p:cNvPr id="15" name="Text Placeholder 12">
-            <a:extLst>
-              <a:ext uri="{FF2B5EF4-FFF2-40B4-BE49-F238E27FC236}">
-                <a16:creationId xmlns:a16="http://schemas.microsoft.com/office/drawing/2014/main" id="{75BBACB5-0770-66D8-2943-738E5528761F}"/>
-              </a:ext>
-            </a:extLst>
-          </p:cNvPr>
-          <p:cNvSpPr>
-            <a:spLocks noGrp="1"/>
-          </p:cNvSpPr>
-          <p:nvPr>
-            <p:ph type="body" idx="1"/>
-          </p:nvPr>
-        </p:nvSpPr>
-        <p:spPr>
-          <a:xfrm>
-            <a:off x="1341120" y="2960877"/>
-            <a:ext cx="4754880" cy="2619766"/>
-          </a:xfrm>
-        </p:spPr>
-        <p:txBody>
-          <a:bodyPr>
-            <a:normAutofit/>
-          </a:bodyPr>
-          <a:lstStyle/>
-          <a:p>
-            <a:pPr>
-              <a:lnSpc>
-                <a:spcPct val="100000"/>
-              </a:lnSpc>
-            </a:pPr>
-            <a:r>
-              <a:rPr lang="en-US">
-                <a:ea typeface="+mj-lt"/>
-                <a:cs typeface="+mj-lt"/>
-              </a:rPr>
-              <a:t>Tech Stack</a:t>
-            </a:r>
-          </a:p>
-          <a:p>
-            <a:pPr>
-              <a:lnSpc>
-                <a:spcPct val="100000"/>
-              </a:lnSpc>
-            </a:pPr>
-            <a:r>
-              <a:rPr lang="en-US" dirty="0">
-                <a:ea typeface="+mj-lt"/>
-                <a:cs typeface="+mj-lt"/>
-              </a:rPr>
-              <a:t>Data Source</a:t>
-            </a:r>
-            <a:endParaRPr lang="en-US" dirty="0"/>
-          </a:p>
-          <a:p>
-            <a:pPr>
-              <a:lnSpc>
-                <a:spcPct val="100000"/>
-              </a:lnSpc>
-            </a:pPr>
-            <a:r>
-              <a:rPr lang="en-US" dirty="0">
-                <a:ea typeface="+mj-lt"/>
-                <a:cs typeface="+mj-lt"/>
-              </a:rPr>
-              <a:t>Preparing the Data</a:t>
-            </a:r>
-            <a:endParaRPr lang="en-US" dirty="0"/>
-          </a:p>
-          <a:p>
-            <a:pPr>
-              <a:lnSpc>
-                <a:spcPct val="100000"/>
-              </a:lnSpc>
-            </a:pPr>
-            <a:r>
-              <a:rPr lang="en-US" dirty="0">
-                <a:ea typeface="+mj-lt"/>
-                <a:cs typeface="+mj-lt"/>
-              </a:rPr>
-              <a:t>Creating a Chroma Database</a:t>
-            </a:r>
-          </a:p>
-          <a:p>
-            <a:pPr>
-              <a:lnSpc>
-                <a:spcPct val="100000"/>
-              </a:lnSpc>
-            </a:pPr>
-            <a:r>
-              <a:rPr lang="en-US" dirty="0">
-                <a:ea typeface="+mj-lt"/>
-                <a:cs typeface="+mj-lt"/>
-              </a:rPr>
-              <a:t>Crafting a Response</a:t>
-            </a:r>
-          </a:p>
-          <a:p>
-            <a:pPr>
-              <a:lnSpc>
-                <a:spcPct val="100000"/>
-              </a:lnSpc>
-            </a:pPr>
-            <a:r>
-              <a:rPr lang="en-US" dirty="0">
-                <a:ea typeface="+mj-lt"/>
-                <a:cs typeface="+mj-lt"/>
-              </a:rPr>
-              <a:t>Results</a:t>
-            </a:r>
-          </a:p>
-        </p:txBody>
+            <a:r>
+              <a:rPr lang="en-US" b="1" dirty="0"/>
+              <a:t>RAG IN ACTION</a:t>
+            </a:r>
+          </a:p>
+        </p:txBody>
+      </p:sp>
+      <p:cxnSp>
+        <p:nvCxnSpPr>
+          <p:cNvPr id="21" name="Straight Connector 20">
+            <a:extLst>
+              <a:ext uri="{FF2B5EF4-FFF2-40B4-BE49-F238E27FC236}">
+                <a16:creationId xmlns:a16="http://schemas.microsoft.com/office/drawing/2014/main" id="{944268F6-A361-9907-F87F-9C4377ECAE6D}"/>
+              </a:ext>
+              <a:ext uri="{C183D7F6-B498-43B3-948B-1728B52AA6E4}">
+                <adec:decorative xmlns:adec="http://schemas.microsoft.com/office/drawing/2017/decorative" val="1"/>
+              </a:ext>
+            </a:extLst>
+          </p:cNvPr>
+          <p:cNvCxnSpPr>
+            <a:cxnSpLocks/>
+          </p:cNvCxnSpPr>
+          <p:nvPr/>
+        </p:nvCxnSpPr>
+        <p:spPr>
+          <a:xfrm flipH="1" flipV="1">
+            <a:off x="0" y="254643"/>
+            <a:ext cx="6096000" cy="855762"/>
+          </a:xfrm>
+          <a:prstGeom prst="line">
+            <a:avLst/>
+          </a:prstGeom>
+          <a:ln>
+            <a:solidFill>
+              <a:schemeClr val="bg1"/>
+            </a:solidFill>
+          </a:ln>
+        </p:spPr>
+        <p:style>
+          <a:lnRef idx="1">
+            <a:schemeClr val="accent1"/>
+          </a:lnRef>
+          <a:fillRef idx="0">
+            <a:schemeClr val="accent1"/>
+          </a:fillRef>
+          <a:effectRef idx="0">
+            <a:schemeClr val="accent1"/>
+          </a:effectRef>
+          <a:fontRef idx="minor">
+            <a:schemeClr val="tx1"/>
+          </a:fontRef>
+        </p:style>
+      </p:cxnSp>
+      <p:sp>
+        <p:nvSpPr>
+          <p:cNvPr id="4" name="Picture Placeholder 3">
+            <a:extLst>
+              <a:ext uri="{FF2B5EF4-FFF2-40B4-BE49-F238E27FC236}">
+                <a16:creationId xmlns:a16="http://schemas.microsoft.com/office/drawing/2014/main" id="{579CB9CA-F71D-D8D1-36A2-F52EAF935252}"/>
+              </a:ext>
+            </a:extLst>
+          </p:cNvPr>
+          <p:cNvSpPr>
+            <a:spLocks noGrp="1"/>
+          </p:cNvSpPr>
+          <p:nvPr>
+            <p:ph type="pic" sz="quarter" idx="10"/>
+          </p:nvPr>
+        </p:nvSpPr>
+        <p:spPr/>
       </p:sp>
     </p:spTree>
     <p:extLst>
       <p:ext uri="{BB962C8B-B14F-4D97-AF65-F5344CB8AC3E}">
-        <p14:creationId xmlns:p14="http://schemas.microsoft.com/office/powerpoint/2010/main" val="2403577982"/>
+        <p14:creationId xmlns:p14="http://schemas.microsoft.com/office/powerpoint/2010/main" val="2471559769"/>
       </p:ext>
     </p:extLst>
   </p:cSld>
@@ -7833,134 +8137,24 @@
       </p:grpSpPr>
       <p:sp>
         <p:nvSpPr>
-          <p:cNvPr id="2" name="Title 1">
-            <a:extLst>
-              <a:ext uri="{FF2B5EF4-FFF2-40B4-BE49-F238E27FC236}">
-                <a16:creationId xmlns:a16="http://schemas.microsoft.com/office/drawing/2014/main" id="{8B27D9B3-B64F-656A-0D99-161A6C0F518F}"/>
-              </a:ext>
-            </a:extLst>
-          </p:cNvPr>
-          <p:cNvSpPr>
-            <a:spLocks noGrp="1"/>
-          </p:cNvSpPr>
-          <p:nvPr>
-            <p:ph type="title"/>
-          </p:nvPr>
-        </p:nvSpPr>
-        <p:spPr>
-          <a:xfrm>
-            <a:off x="1341120" y="558801"/>
-            <a:ext cx="9953308" cy="1780860"/>
-          </a:xfrm>
-        </p:spPr>
-        <p:txBody>
-          <a:bodyPr/>
-          <a:lstStyle/>
-          <a:p>
-            <a:r>
-              <a:rPr lang="en-US" sz="1800" b="1">
-                <a:ea typeface="+mj-lt"/>
-                <a:cs typeface="+mj-lt"/>
-              </a:rPr>
-              <a:t>Tech Stack</a:t>
-            </a:r>
-            <a:endParaRPr lang="en-US" sz="1800">
-              <a:ea typeface="+mj-lt"/>
-              <a:cs typeface="+mj-lt"/>
-            </a:endParaRPr>
-          </a:p>
-        </p:txBody>
-      </p:sp>
-      <p:sp>
-        <p:nvSpPr>
-          <p:cNvPr id="36" name="Content Placeholder 35">
-            <a:extLst>
-              <a:ext uri="{FF2B5EF4-FFF2-40B4-BE49-F238E27FC236}">
-                <a16:creationId xmlns:a16="http://schemas.microsoft.com/office/drawing/2014/main" id="{E71298F0-74F1-FECA-0F02-495F9A2EBA7B}"/>
-              </a:ext>
-            </a:extLst>
-          </p:cNvPr>
-          <p:cNvSpPr>
-            <a:spLocks noGrp="1"/>
-          </p:cNvSpPr>
-          <p:nvPr>
-            <p:ph sz="half" idx="15"/>
-          </p:nvPr>
-        </p:nvSpPr>
-        <p:spPr>
-          <a:xfrm>
-            <a:off x="1341120" y="3427069"/>
-            <a:ext cx="6182535" cy="2924681"/>
-          </a:xfrm>
-        </p:spPr>
-        <p:txBody>
-          <a:bodyPr vert="horz" lIns="91440" tIns="0" rIns="91440" bIns="45720" rtlCol="0" anchor="t">
-            <a:normAutofit/>
-          </a:bodyPr>
-          <a:lstStyle/>
-          <a:p>
-            <a:pPr marL="283210" indent="-283210"/>
-            <a:r>
-              <a:rPr lang="en-US" dirty="0"/>
-              <a:t>Python</a:t>
-            </a:r>
-          </a:p>
-          <a:p>
-            <a:pPr marL="283210" indent="-283210"/>
-            <a:r>
-              <a:rPr lang="en-US" dirty="0" err="1"/>
-              <a:t>Langchain</a:t>
-            </a:r>
-            <a:r>
-              <a:rPr lang="en-US" dirty="0"/>
-              <a:t> </a:t>
-            </a:r>
-          </a:p>
-          <a:p>
-            <a:pPr marL="283210" indent="-283210"/>
-            <a:r>
-              <a:rPr lang="en-US" dirty="0" err="1"/>
-              <a:t>Ollama</a:t>
-            </a:r>
-            <a:r>
-              <a:rPr lang="en-US" dirty="0"/>
-              <a:t> / </a:t>
-            </a:r>
-            <a:r>
-              <a:rPr lang="en-US" dirty="0" err="1"/>
-              <a:t>OpenAi</a:t>
-            </a:r>
-          </a:p>
-          <a:p>
-            <a:pPr marL="283210" indent="-283210"/>
-            <a:endParaRPr lang="en-US" dirty="0"/>
-          </a:p>
-          <a:p>
-            <a:pPr marL="283210" indent="-283210"/>
-            <a:endParaRPr lang="en-US" dirty="0"/>
-          </a:p>
-        </p:txBody>
-      </p:sp>
-      <p:sp>
-        <p:nvSpPr>
-          <p:cNvPr id="68" name="Slide Number Placeholder 67">
-            <a:extLst>
-              <a:ext uri="{FF2B5EF4-FFF2-40B4-BE49-F238E27FC236}">
-                <a16:creationId xmlns:a16="http://schemas.microsoft.com/office/drawing/2014/main" id="{AA0ACADD-CC4E-851C-DA07-C22DB97FA23E}"/>
-              </a:ext>
-            </a:extLst>
-          </p:cNvPr>
-          <p:cNvSpPr>
-            <a:spLocks noGrp="1"/>
-          </p:cNvSpPr>
-          <p:nvPr>
-            <p:ph type="sldNum" sz="quarter" idx="13"/>
-          </p:nvPr>
-        </p:nvSpPr>
-        <p:spPr>
-          <a:xfrm>
-            <a:off x="10373350" y="6356349"/>
-            <a:ext cx="987552" cy="365125"/>
+          <p:cNvPr id="9" name="Slide Number Placeholder 8">
+            <a:extLst>
+              <a:ext uri="{FF2B5EF4-FFF2-40B4-BE49-F238E27FC236}">
+                <a16:creationId xmlns:a16="http://schemas.microsoft.com/office/drawing/2014/main" id="{C396FFDC-ADE8-4009-A466-A81787258E88}"/>
+              </a:ext>
+            </a:extLst>
+          </p:cNvPr>
+          <p:cNvSpPr>
+            <a:spLocks noGrp="1"/>
+          </p:cNvSpPr>
+          <p:nvPr>
+            <p:ph type="sldNum" sz="quarter" idx="12"/>
+          </p:nvPr>
+        </p:nvSpPr>
+        <p:spPr>
+          <a:xfrm>
+            <a:off x="8610600" y="6356350"/>
+            <a:ext cx="2743200" cy="365125"/>
           </a:xfrm>
         </p:spPr>
         <p:txBody>
@@ -7978,153 +8172,156 @@
       </p:sp>
       <p:sp>
         <p:nvSpPr>
-          <p:cNvPr id="4" name="Text Placeholder 3">
-            <a:extLst>
-              <a:ext uri="{FF2B5EF4-FFF2-40B4-BE49-F238E27FC236}">
-                <a16:creationId xmlns:a16="http://schemas.microsoft.com/office/drawing/2014/main" id="{6D16E141-E5F9-F3F6-9606-52F3415DA9BA}"/>
-              </a:ext>
-            </a:extLst>
-          </p:cNvPr>
-          <p:cNvSpPr>
-            <a:spLocks noGrp="1"/>
-          </p:cNvSpPr>
-          <p:nvPr>
-            <p:ph type="body" idx="1"/>
-          </p:nvPr>
-        </p:nvSpPr>
-        <p:spPr/>
+          <p:cNvPr id="13" name="Title 1">
+            <a:extLst>
+              <a:ext uri="{FF2B5EF4-FFF2-40B4-BE49-F238E27FC236}">
+                <a16:creationId xmlns:a16="http://schemas.microsoft.com/office/drawing/2014/main" id="{1DA7F7F3-5771-6E73-62C6-D2CBD438E955}"/>
+              </a:ext>
+            </a:extLst>
+          </p:cNvPr>
+          <p:cNvSpPr>
+            <a:spLocks noGrp="1"/>
+          </p:cNvSpPr>
+          <p:nvPr>
+            <p:ph type="title"/>
+          </p:nvPr>
+        </p:nvSpPr>
+        <p:spPr>
+          <a:xfrm>
+            <a:off x="1341120" y="558801"/>
+            <a:ext cx="9953308" cy="1780860"/>
+          </a:xfrm>
+        </p:spPr>
         <p:txBody>
           <a:bodyPr/>
           <a:lstStyle/>
           <a:p>
-            <a:endParaRPr lang="en-US"/>
-          </a:p>
-        </p:txBody>
-      </p:sp>
-      <p:pic>
-        <p:nvPicPr>
-          <p:cNvPr id="5" name="Picture 4" descr="File:Python-logo-notext.svg - Wikipedia">
-            <a:extLst>
-              <a:ext uri="{FF2B5EF4-FFF2-40B4-BE49-F238E27FC236}">
-                <a16:creationId xmlns:a16="http://schemas.microsoft.com/office/drawing/2014/main" id="{547ECF91-C9C0-8FF6-C03A-18D1550AC187}"/>
-              </a:ext>
-            </a:extLst>
-          </p:cNvPr>
-          <p:cNvPicPr>
-            <a:picLocks noChangeAspect="1"/>
-          </p:cNvPicPr>
-          <p:nvPr/>
-        </p:nvPicPr>
-        <p:blipFill>
-          <a:blip r:embed="rId3"/>
-          <a:stretch>
-            <a:fillRect/>
-          </a:stretch>
-        </p:blipFill>
-        <p:spPr>
-          <a:xfrm>
-            <a:off x="5076825" y="2309812"/>
-            <a:ext cx="2038350" cy="2238375"/>
-          </a:xfrm>
-          <a:prstGeom prst="rect">
-            <a:avLst/>
-          </a:prstGeom>
-        </p:spPr>
-      </p:pic>
-      <p:pic>
-        <p:nvPicPr>
-          <p:cNvPr id="6" name="Picture 5" descr="What is LangChain? AI App Development ...">
-            <a:extLst>
-              <a:ext uri="{FF2B5EF4-FFF2-40B4-BE49-F238E27FC236}">
-                <a16:creationId xmlns:a16="http://schemas.microsoft.com/office/drawing/2014/main" id="{EF850A27-0089-1531-255A-20C71BCED46C}"/>
-              </a:ext>
-            </a:extLst>
-          </p:cNvPr>
-          <p:cNvPicPr>
-            <a:picLocks noChangeAspect="1"/>
-          </p:cNvPicPr>
-          <p:nvPr/>
-        </p:nvPicPr>
-        <p:blipFill>
-          <a:blip r:embed="rId4"/>
-          <a:stretch>
-            <a:fillRect/>
-          </a:stretch>
-        </p:blipFill>
-        <p:spPr>
-          <a:xfrm>
-            <a:off x="7345197" y="1557196"/>
-            <a:ext cx="3028950" cy="1514475"/>
-          </a:xfrm>
-          <a:prstGeom prst="rect">
-            <a:avLst/>
-          </a:prstGeom>
-        </p:spPr>
-      </p:pic>
-      <p:pic>
-        <p:nvPicPr>
-          <p:cNvPr id="7" name="Picture 6" descr="Ollama: Get up and running with large ...">
-            <a:extLst>
-              <a:ext uri="{FF2B5EF4-FFF2-40B4-BE49-F238E27FC236}">
-                <a16:creationId xmlns:a16="http://schemas.microsoft.com/office/drawing/2014/main" id="{45E2C4BC-C8CC-90D9-73F6-7887F0935D13}"/>
-              </a:ext>
-            </a:extLst>
-          </p:cNvPr>
-          <p:cNvPicPr>
-            <a:picLocks noChangeAspect="1"/>
-          </p:cNvPicPr>
-          <p:nvPr/>
-        </p:nvPicPr>
-        <p:blipFill>
-          <a:blip r:embed="rId5"/>
-          <a:stretch>
-            <a:fillRect/>
-          </a:stretch>
-        </p:blipFill>
-        <p:spPr>
-          <a:xfrm>
-            <a:off x="8936795" y="3312781"/>
-            <a:ext cx="2143125" cy="2143125"/>
-          </a:xfrm>
-          <a:prstGeom prst="rect">
-            <a:avLst/>
-          </a:prstGeom>
-        </p:spPr>
-      </p:pic>
-      <p:pic>
-        <p:nvPicPr>
-          <p:cNvPr id="8" name="Picture 7" descr="File:ChatGPT-Logo.png - Wikipedia">
-            <a:extLst>
-              <a:ext uri="{FF2B5EF4-FFF2-40B4-BE49-F238E27FC236}">
-                <a16:creationId xmlns:a16="http://schemas.microsoft.com/office/drawing/2014/main" id="{953BD7B3-FDF5-AD30-D48D-5D7786ECA83A}"/>
-              </a:ext>
-            </a:extLst>
-          </p:cNvPr>
-          <p:cNvPicPr>
-            <a:picLocks noChangeAspect="1"/>
-          </p:cNvPicPr>
-          <p:nvPr/>
-        </p:nvPicPr>
-        <p:blipFill>
-          <a:blip r:embed="rId6"/>
-          <a:stretch>
-            <a:fillRect/>
-          </a:stretch>
-        </p:blipFill>
-        <p:spPr>
-          <a:xfrm>
-            <a:off x="5076683" y="4664691"/>
-            <a:ext cx="2857500" cy="1600200"/>
-          </a:xfrm>
-          <a:prstGeom prst="rect">
-            <a:avLst/>
-          </a:prstGeom>
-        </p:spPr>
-      </p:pic>
+            <a:r>
+              <a:rPr lang="en-US"/>
+              <a:t>DEMO OVERVIEW</a:t>
+            </a:r>
+          </a:p>
+        </p:txBody>
+      </p:sp>
+      <p:sp>
+        <p:nvSpPr>
+          <p:cNvPr id="15" name="Text Placeholder 12">
+            <a:extLst>
+              <a:ext uri="{FF2B5EF4-FFF2-40B4-BE49-F238E27FC236}">
+                <a16:creationId xmlns:a16="http://schemas.microsoft.com/office/drawing/2014/main" id="{75BBACB5-0770-66D8-2943-738E5528761F}"/>
+              </a:ext>
+            </a:extLst>
+          </p:cNvPr>
+          <p:cNvSpPr>
+            <a:spLocks noGrp="1"/>
+          </p:cNvSpPr>
+          <p:nvPr>
+            <p:ph type="body" idx="1"/>
+          </p:nvPr>
+        </p:nvSpPr>
+        <p:spPr>
+          <a:xfrm>
+            <a:off x="1341120" y="2960877"/>
+            <a:ext cx="4754880" cy="2619766"/>
+          </a:xfrm>
+        </p:spPr>
+        <p:txBody>
+          <a:bodyPr>
+            <a:normAutofit/>
+          </a:bodyPr>
+          <a:lstStyle/>
+          <a:p>
+            <a:pPr>
+              <a:lnSpc>
+                <a:spcPct val="100000"/>
+              </a:lnSpc>
+            </a:pPr>
+            <a:r>
+              <a:rPr lang="en-US">
+                <a:ea typeface="+mj-lt"/>
+                <a:cs typeface="+mj-lt"/>
+              </a:rPr>
+              <a:t>Tech Stack</a:t>
+            </a:r>
+          </a:p>
+          <a:p>
+            <a:pPr>
+              <a:lnSpc>
+                <a:spcPct val="100000"/>
+              </a:lnSpc>
+            </a:pPr>
+            <a:r>
+              <a:rPr lang="en-US" dirty="0">
+                <a:ea typeface="+mj-lt"/>
+                <a:cs typeface="+mj-lt"/>
+              </a:rPr>
+              <a:t>Data Source</a:t>
+            </a:r>
+            <a:endParaRPr lang="en-US" dirty="0"/>
+          </a:p>
+          <a:p>
+            <a:pPr>
+              <a:lnSpc>
+                <a:spcPct val="100000"/>
+              </a:lnSpc>
+            </a:pPr>
+            <a:r>
+              <a:rPr lang="en-US" dirty="0">
+                <a:ea typeface="+mj-lt"/>
+                <a:cs typeface="+mj-lt"/>
+              </a:rPr>
+              <a:t>Preparing the Data</a:t>
+            </a:r>
+            <a:endParaRPr lang="en-US" dirty="0"/>
+          </a:p>
+          <a:p>
+            <a:pPr>
+              <a:lnSpc>
+                <a:spcPct val="100000"/>
+              </a:lnSpc>
+            </a:pPr>
+            <a:r>
+              <a:rPr lang="en-US" dirty="0">
+                <a:ea typeface="+mj-lt"/>
+                <a:cs typeface="+mj-lt"/>
+              </a:rPr>
+              <a:t>Creating a Chroma Database</a:t>
+            </a:r>
+          </a:p>
+          <a:p>
+            <a:pPr>
+              <a:lnSpc>
+                <a:spcPct val="100000"/>
+              </a:lnSpc>
+            </a:pPr>
+            <a:r>
+              <a:rPr lang="en-US" dirty="0">
+                <a:ea typeface="+mj-lt"/>
+                <a:cs typeface="+mj-lt"/>
+              </a:rPr>
+              <a:t>Crafting a Response</a:t>
+            </a:r>
+          </a:p>
+          <a:p>
+            <a:pPr>
+              <a:lnSpc>
+                <a:spcPct val="100000"/>
+              </a:lnSpc>
+            </a:pPr>
+            <a:r>
+              <a:rPr lang="en-US" dirty="0">
+                <a:ea typeface="+mj-lt"/>
+                <a:cs typeface="+mj-lt"/>
+              </a:rPr>
+              <a:t>Results</a:t>
+            </a:r>
+          </a:p>
+        </p:txBody>
+      </p:sp>
     </p:spTree>
     <p:extLst>
       <p:ext uri="{BB962C8B-B14F-4D97-AF65-F5344CB8AC3E}">
-        <p14:creationId xmlns:p14="http://schemas.microsoft.com/office/powerpoint/2010/main" val="3663694483"/>
+        <p14:creationId xmlns:p14="http://schemas.microsoft.com/office/powerpoint/2010/main" val="2403577982"/>
       </p:ext>
     </p:extLst>
   </p:cSld>
@@ -8182,7 +8379,7 @@
                 <a:ea typeface="+mj-lt"/>
                 <a:cs typeface="+mj-lt"/>
               </a:rPr>
-              <a:t>Data Source</a:t>
+              <a:t>Tech Stack</a:t>
             </a:r>
             <a:endParaRPr lang="en-US" sz="1800">
               <a:ea typeface="+mj-lt"/>
@@ -8193,36 +8390,6 @@
       </p:sp>
       <p:sp>
         <p:nvSpPr>
-          <p:cNvPr id="13" name="Text Placeholder 12">
-            <a:extLst>
-              <a:ext uri="{FF2B5EF4-FFF2-40B4-BE49-F238E27FC236}">
-                <a16:creationId xmlns:a16="http://schemas.microsoft.com/office/drawing/2014/main" id="{7E5B6E40-3A7D-ACF7-AA38-25977D322D81}"/>
-              </a:ext>
-            </a:extLst>
-          </p:cNvPr>
-          <p:cNvSpPr>
-            <a:spLocks noGrp="1"/>
-          </p:cNvSpPr>
-          <p:nvPr>
-            <p:ph type="body" idx="1"/>
-          </p:nvPr>
-        </p:nvSpPr>
-        <p:spPr>
-          <a:xfrm>
-            <a:off x="1341120" y="2960877"/>
-            <a:ext cx="4754880" cy="351284"/>
-          </a:xfrm>
-        </p:spPr>
-        <p:txBody>
-          <a:bodyPr/>
-          <a:lstStyle/>
-          <a:p>
-            <a:endParaRPr lang="en-US" dirty="0"/>
-          </a:p>
-        </p:txBody>
-      </p:sp>
-      <p:sp>
-        <p:nvSpPr>
           <p:cNvPr id="36" name="Content Placeholder 35">
             <a:extLst>
               <a:ext uri="{FF2B5EF4-FFF2-40B4-BE49-F238E27FC236}">
@@ -8252,22 +8419,42 @@
             <a:pPr marL="283210" indent="-283210"/>
             <a:r>
               <a:rPr lang="en-US" dirty="0"/>
-              <a:t>Texts</a:t>
+              <a:t>Python</a:t>
             </a:r>
           </a:p>
           <a:p>
             <a:pPr marL="283210" indent="-283210"/>
             <a:r>
-              <a:rPr lang="en-US" dirty="0"/>
-              <a:t>Documents (PDFs)</a:t>
+              <a:rPr lang="en-US" dirty="0" err="1"/>
+              <a:t>Langchain</a:t>
+            </a:r>
+            <a:r>
+              <a:rPr lang="en-US" dirty="0"/>
+              <a:t> </a:t>
             </a:r>
           </a:p>
           <a:p>
             <a:pPr marL="283210" indent="-283210"/>
             <a:r>
-              <a:rPr lang="en-US" dirty="0"/>
-              <a:t>Database</a:t>
-            </a:r>
+              <a:rPr lang="en-US" dirty="0" err="1"/>
+              <a:t>Ollama</a:t>
+            </a:r>
+            <a:r>
+              <a:rPr lang="en-US" dirty="0"/>
+              <a:t> / </a:t>
+            </a:r>
+            <a:r>
+              <a:rPr lang="en-US" dirty="0" err="1"/>
+              <a:t>OpenAi</a:t>
+            </a:r>
+          </a:p>
+          <a:p>
+            <a:pPr marL="283210" indent="-283210"/>
+            <a:endParaRPr lang="en-US" dirty="0"/>
+          </a:p>
+          <a:p>
+            <a:pPr marL="283210" indent="-283210"/>
+            <a:endParaRPr lang="en-US" dirty="0"/>
           </a:p>
         </p:txBody>
       </p:sp>
@@ -8306,12 +8493,37 @@
           </a:p>
         </p:txBody>
       </p:sp>
+      <p:sp>
+        <p:nvSpPr>
+          <p:cNvPr id="4" name="Text Placeholder 3">
+            <a:extLst>
+              <a:ext uri="{FF2B5EF4-FFF2-40B4-BE49-F238E27FC236}">
+                <a16:creationId xmlns:a16="http://schemas.microsoft.com/office/drawing/2014/main" id="{6D16E141-E5F9-F3F6-9606-52F3415DA9BA}"/>
+              </a:ext>
+            </a:extLst>
+          </p:cNvPr>
+          <p:cNvSpPr>
+            <a:spLocks noGrp="1"/>
+          </p:cNvSpPr>
+          <p:nvPr>
+            <p:ph type="body" idx="1"/>
+          </p:nvPr>
+        </p:nvSpPr>
+        <p:spPr/>
+        <p:txBody>
+          <a:bodyPr/>
+          <a:lstStyle/>
+          <a:p>
+            <a:endParaRPr lang="en-US"/>
+          </a:p>
+        </p:txBody>
+      </p:sp>
       <p:pic>
         <p:nvPicPr>
-          <p:cNvPr id="3" name="Picture 2">
-            <a:extLst>
-              <a:ext uri="{FF2B5EF4-FFF2-40B4-BE49-F238E27FC236}">
-                <a16:creationId xmlns:a16="http://schemas.microsoft.com/office/drawing/2014/main" id="{8515C7E0-CC15-A488-419F-66DA87CF8652}"/>
+          <p:cNvPr id="5" name="Picture 4" descr="File:Python-logo-notext.svg - Wikipedia">
+            <a:extLst>
+              <a:ext uri="{FF2B5EF4-FFF2-40B4-BE49-F238E27FC236}">
+                <a16:creationId xmlns:a16="http://schemas.microsoft.com/office/drawing/2014/main" id="{547ECF91-C9C0-8FF6-C03A-18D1550AC187}"/>
               </a:ext>
             </a:extLst>
           </p:cNvPr>
@@ -8328,8 +8540,98 @@
         </p:blipFill>
         <p:spPr>
           <a:xfrm>
-            <a:off x="6099198" y="1452989"/>
-            <a:ext cx="4429125" cy="4543425"/>
+            <a:off x="5076825" y="2309812"/>
+            <a:ext cx="2038350" cy="2238375"/>
+          </a:xfrm>
+          <a:prstGeom prst="rect">
+            <a:avLst/>
+          </a:prstGeom>
+        </p:spPr>
+      </p:pic>
+      <p:pic>
+        <p:nvPicPr>
+          <p:cNvPr id="6" name="Picture 5" descr="What is LangChain? AI App Development ...">
+            <a:extLst>
+              <a:ext uri="{FF2B5EF4-FFF2-40B4-BE49-F238E27FC236}">
+                <a16:creationId xmlns:a16="http://schemas.microsoft.com/office/drawing/2014/main" id="{EF850A27-0089-1531-255A-20C71BCED46C}"/>
+              </a:ext>
+            </a:extLst>
+          </p:cNvPr>
+          <p:cNvPicPr>
+            <a:picLocks noChangeAspect="1"/>
+          </p:cNvPicPr>
+          <p:nvPr/>
+        </p:nvPicPr>
+        <p:blipFill>
+          <a:blip r:embed="rId4"/>
+          <a:stretch>
+            <a:fillRect/>
+          </a:stretch>
+        </p:blipFill>
+        <p:spPr>
+          <a:xfrm>
+            <a:off x="7345197" y="1557196"/>
+            <a:ext cx="3028950" cy="1514475"/>
+          </a:xfrm>
+          <a:prstGeom prst="rect">
+            <a:avLst/>
+          </a:prstGeom>
+        </p:spPr>
+      </p:pic>
+      <p:pic>
+        <p:nvPicPr>
+          <p:cNvPr id="7" name="Picture 6" descr="Ollama: Get up and running with large ...">
+            <a:extLst>
+              <a:ext uri="{FF2B5EF4-FFF2-40B4-BE49-F238E27FC236}">
+                <a16:creationId xmlns:a16="http://schemas.microsoft.com/office/drawing/2014/main" id="{45E2C4BC-C8CC-90D9-73F6-7887F0935D13}"/>
+              </a:ext>
+            </a:extLst>
+          </p:cNvPr>
+          <p:cNvPicPr>
+            <a:picLocks noChangeAspect="1"/>
+          </p:cNvPicPr>
+          <p:nvPr/>
+        </p:nvPicPr>
+        <p:blipFill>
+          <a:blip r:embed="rId5"/>
+          <a:stretch>
+            <a:fillRect/>
+          </a:stretch>
+        </p:blipFill>
+        <p:spPr>
+          <a:xfrm>
+            <a:off x="8936795" y="3312781"/>
+            <a:ext cx="2143125" cy="2143125"/>
+          </a:xfrm>
+          <a:prstGeom prst="rect">
+            <a:avLst/>
+          </a:prstGeom>
+        </p:spPr>
+      </p:pic>
+      <p:pic>
+        <p:nvPicPr>
+          <p:cNvPr id="8" name="Picture 7" descr="File:ChatGPT-Logo.png - Wikipedia">
+            <a:extLst>
+              <a:ext uri="{FF2B5EF4-FFF2-40B4-BE49-F238E27FC236}">
+                <a16:creationId xmlns:a16="http://schemas.microsoft.com/office/drawing/2014/main" id="{953BD7B3-FDF5-AD30-D48D-5D7786ECA83A}"/>
+              </a:ext>
+            </a:extLst>
+          </p:cNvPr>
+          <p:cNvPicPr>
+            <a:picLocks noChangeAspect="1"/>
+          </p:cNvPicPr>
+          <p:nvPr/>
+        </p:nvPicPr>
+        <p:blipFill>
+          <a:blip r:embed="rId6"/>
+          <a:stretch>
+            <a:fillRect/>
+          </a:stretch>
+        </p:blipFill>
+        <p:spPr>
+          <a:xfrm>
+            <a:off x="5076683" y="4664691"/>
+            <a:ext cx="2857500" cy="1600200"/>
           </a:xfrm>
           <a:prstGeom prst="rect">
             <a:avLst/>
@@ -8339,7 +8641,7 @@
     </p:spTree>
     <p:extLst>
       <p:ext uri="{BB962C8B-B14F-4D97-AF65-F5344CB8AC3E}">
-        <p14:creationId xmlns:p14="http://schemas.microsoft.com/office/powerpoint/2010/main" val="2316803758"/>
+        <p14:creationId xmlns:p14="http://schemas.microsoft.com/office/powerpoint/2010/main" val="3663694483"/>
       </p:ext>
     </p:extLst>
   </p:cSld>
@@ -8393,20 +8695,17 @@
           <a:lstStyle/>
           <a:p>
             <a:r>
-              <a:rPr lang="en-US" sz="1800" b="1" dirty="0">
+              <a:rPr lang="en-US" sz="1800" b="1">
                 <a:ea typeface="+mj-lt"/>
                 <a:cs typeface="+mj-lt"/>
               </a:rPr>
-              <a:t>Preparing the Data</a:t>
+              <a:t>Data Source</a:t>
             </a:r>
             <a:endParaRPr lang="en-US" sz="1800">
               <a:ea typeface="+mj-lt"/>
               <a:cs typeface="+mj-lt"/>
             </a:endParaRPr>
           </a:p>
-          <a:p>
-            <a:endParaRPr lang="en-US" dirty="0"/>
-          </a:p>
         </p:txBody>
       </p:sp>
       <p:sp>
@@ -8469,13 +8768,23 @@
           <a:p>
             <a:pPr marL="283210" indent="-283210"/>
             <a:r>
-              <a:rPr lang="en-US" dirty="0">
-                <a:ea typeface="+mn-lt"/>
-                <a:cs typeface="+mn-lt"/>
-              </a:rPr>
-              <a:t>This involves splitting the documents into smaller chunks for more focused searching.</a:t>
-            </a:r>
-            <a:endParaRPr lang="en-US" dirty="0"/>
+              <a:rPr lang="en-US" dirty="0"/>
+              <a:t>Texts</a:t>
+            </a:r>
+          </a:p>
+          <a:p>
+            <a:pPr marL="283210" indent="-283210"/>
+            <a:r>
+              <a:rPr lang="en-US" dirty="0"/>
+              <a:t>Documents (PDFs)</a:t>
+            </a:r>
+          </a:p>
+          <a:p>
+            <a:pPr marL="283210" indent="-283210"/>
+            <a:r>
+              <a:rPr lang="en-US" dirty="0"/>
+              <a:t>Database</a:t>
+            </a:r>
           </a:p>
         </p:txBody>
       </p:sp>
@@ -8514,10 +8823,40 @@
           </a:p>
         </p:txBody>
       </p:sp>
+      <p:pic>
+        <p:nvPicPr>
+          <p:cNvPr id="3" name="Picture 2">
+            <a:extLst>
+              <a:ext uri="{FF2B5EF4-FFF2-40B4-BE49-F238E27FC236}">
+                <a16:creationId xmlns:a16="http://schemas.microsoft.com/office/drawing/2014/main" id="{8515C7E0-CC15-A488-419F-66DA87CF8652}"/>
+              </a:ext>
+            </a:extLst>
+          </p:cNvPr>
+          <p:cNvPicPr>
+            <a:picLocks noChangeAspect="1"/>
+          </p:cNvPicPr>
+          <p:nvPr/>
+        </p:nvPicPr>
+        <p:blipFill>
+          <a:blip r:embed="rId3"/>
+          <a:stretch>
+            <a:fillRect/>
+          </a:stretch>
+        </p:blipFill>
+        <p:spPr>
+          <a:xfrm>
+            <a:off x="6099198" y="1452989"/>
+            <a:ext cx="4429125" cy="4543425"/>
+          </a:xfrm>
+          <a:prstGeom prst="rect">
+            <a:avLst/>
+          </a:prstGeom>
+        </p:spPr>
+      </p:pic>
     </p:spTree>
     <p:extLst>
       <p:ext uri="{BB962C8B-B14F-4D97-AF65-F5344CB8AC3E}">
-        <p14:creationId xmlns:p14="http://schemas.microsoft.com/office/powerpoint/2010/main" val="2709361048"/>
+        <p14:creationId xmlns:p14="http://schemas.microsoft.com/office/powerpoint/2010/main" val="2316803758"/>
       </p:ext>
     </p:extLst>
   </p:cSld>
@@ -8571,17 +8910,50 @@
           <a:lstStyle/>
           <a:p>
             <a:r>
-              <a:rPr lang="en-US" sz="1800" b="1">
+              <a:rPr lang="en-US" sz="1800" b="1" dirty="0">
                 <a:ea typeface="+mj-lt"/>
                 <a:cs typeface="+mj-lt"/>
               </a:rPr>
-              <a:t>Creating a Chroma Database</a:t>
+              <a:t>Preparing the Data</a:t>
             </a:r>
             <a:endParaRPr lang="en-US" sz="1800">
               <a:ea typeface="+mj-lt"/>
               <a:cs typeface="+mj-lt"/>
             </a:endParaRPr>
           </a:p>
+          <a:p>
+            <a:endParaRPr lang="en-US" dirty="0"/>
+          </a:p>
+        </p:txBody>
+      </p:sp>
+      <p:sp>
+        <p:nvSpPr>
+          <p:cNvPr id="13" name="Text Placeholder 12">
+            <a:extLst>
+              <a:ext uri="{FF2B5EF4-FFF2-40B4-BE49-F238E27FC236}">
+                <a16:creationId xmlns:a16="http://schemas.microsoft.com/office/drawing/2014/main" id="{7E5B6E40-3A7D-ACF7-AA38-25977D322D81}"/>
+              </a:ext>
+            </a:extLst>
+          </p:cNvPr>
+          <p:cNvSpPr>
+            <a:spLocks noGrp="1"/>
+          </p:cNvSpPr>
+          <p:nvPr>
+            <p:ph type="body" idx="1"/>
+          </p:nvPr>
+        </p:nvSpPr>
+        <p:spPr>
+          <a:xfrm>
+            <a:off x="1341120" y="2960877"/>
+            <a:ext cx="4754880" cy="351284"/>
+          </a:xfrm>
+        </p:spPr>
+        <p:txBody>
+          <a:bodyPr/>
+          <a:lstStyle/>
+          <a:p>
+            <a:endParaRPr lang="en-US" dirty="0"/>
+          </a:p>
         </p:txBody>
       </p:sp>
       <p:sp>
@@ -8602,7 +8974,7 @@
         </p:nvSpPr>
         <p:spPr>
           <a:xfrm>
-            <a:off x="1341120" y="2619577"/>
+            <a:off x="1341120" y="3427069"/>
             <a:ext cx="6182535" cy="2924681"/>
           </a:xfrm>
         </p:spPr>
@@ -8614,19 +8986,15 @@
           <a:p>
             <a:pPr marL="283210" indent="-283210"/>
             <a:r>
-              <a:rPr lang="en-US" dirty="0" err="1">
-                <a:ea typeface="+mn-lt"/>
-                <a:cs typeface="+mn-lt"/>
-              </a:rPr>
-              <a:t>ChromaDB</a:t>
-            </a:r>
-            <a:r>
               <a:rPr lang="en-US" dirty="0">
                 <a:ea typeface="+mn-lt"/>
                 <a:cs typeface="+mn-lt"/>
               </a:rPr>
-              <a:t>, a special database that utilizes vector embeddings to efficiently search through the text chunks.</a:t>
-            </a:r>
+              <a:t>This involves splitting the documents into smaller chunks for more focused searching.</a:t>
+            </a:r>
+          </a:p>
+          <a:p>
+            <a:pPr marL="283210" indent="-283210"/>
             <a:endParaRPr lang="en-US" dirty="0"/>
           </a:p>
         </p:txBody>
@@ -8666,40 +9034,10 @@
           </a:p>
         </p:txBody>
       </p:sp>
-      <p:pic>
-        <p:nvPicPr>
-          <p:cNvPr id="5" name="Picture 4" descr="A diagram of a product&#10;&#10;Description automatically generated">
-            <a:extLst>
-              <a:ext uri="{FF2B5EF4-FFF2-40B4-BE49-F238E27FC236}">
-                <a16:creationId xmlns:a16="http://schemas.microsoft.com/office/drawing/2014/main" id="{0C7AC10D-4A9E-B60C-8162-0EA72350D7F4}"/>
-              </a:ext>
-            </a:extLst>
-          </p:cNvPr>
-          <p:cNvPicPr>
-            <a:picLocks noChangeAspect="1"/>
-          </p:cNvPicPr>
-          <p:nvPr/>
-        </p:nvPicPr>
-        <p:blipFill>
-          <a:blip r:embed="rId3"/>
-          <a:stretch>
-            <a:fillRect/>
-          </a:stretch>
-        </p:blipFill>
-        <p:spPr>
-          <a:xfrm>
-            <a:off x="1342314" y="3493613"/>
-            <a:ext cx="9507371" cy="3225848"/>
-          </a:xfrm>
-          <a:prstGeom prst="rect">
-            <a:avLst/>
-          </a:prstGeom>
-        </p:spPr>
-      </p:pic>
     </p:spTree>
     <p:extLst>
       <p:ext uri="{BB962C8B-B14F-4D97-AF65-F5344CB8AC3E}">
-        <p14:creationId xmlns:p14="http://schemas.microsoft.com/office/powerpoint/2010/main" val="2181802535"/>
+        <p14:creationId xmlns:p14="http://schemas.microsoft.com/office/powerpoint/2010/main" val="2709361048"/>
       </p:ext>
     </p:extLst>
   </p:cSld>
@@ -8731,6 +9069,188 @@
           <p:cNvPr id="2" name="Title 1">
             <a:extLst>
               <a:ext uri="{FF2B5EF4-FFF2-40B4-BE49-F238E27FC236}">
+                <a16:creationId xmlns:a16="http://schemas.microsoft.com/office/drawing/2014/main" id="{8B27D9B3-B64F-656A-0D99-161A6C0F518F}"/>
+              </a:ext>
+            </a:extLst>
+          </p:cNvPr>
+          <p:cNvSpPr>
+            <a:spLocks noGrp="1"/>
+          </p:cNvSpPr>
+          <p:nvPr>
+            <p:ph type="title"/>
+          </p:nvPr>
+        </p:nvSpPr>
+        <p:spPr>
+          <a:xfrm>
+            <a:off x="1341120" y="-70373"/>
+            <a:ext cx="9953308" cy="1780860"/>
+          </a:xfrm>
+        </p:spPr>
+        <p:txBody>
+          <a:bodyPr/>
+          <a:lstStyle/>
+          <a:p>
+            <a:r>
+              <a:rPr lang="en-US" sz="1800" b="1">
+                <a:ea typeface="+mj-lt"/>
+                <a:cs typeface="+mj-lt"/>
+              </a:rPr>
+              <a:t>Creating a Chroma Database</a:t>
+            </a:r>
+            <a:endParaRPr lang="en-US" sz="1800">
+              <a:ea typeface="+mj-lt"/>
+              <a:cs typeface="+mj-lt"/>
+            </a:endParaRPr>
+          </a:p>
+        </p:txBody>
+      </p:sp>
+      <p:sp>
+        <p:nvSpPr>
+          <p:cNvPr id="36" name="Content Placeholder 35">
+            <a:extLst>
+              <a:ext uri="{FF2B5EF4-FFF2-40B4-BE49-F238E27FC236}">
+                <a16:creationId xmlns:a16="http://schemas.microsoft.com/office/drawing/2014/main" id="{E71298F0-74F1-FECA-0F02-495F9A2EBA7B}"/>
+              </a:ext>
+            </a:extLst>
+          </p:cNvPr>
+          <p:cNvSpPr>
+            <a:spLocks noGrp="1"/>
+          </p:cNvSpPr>
+          <p:nvPr>
+            <p:ph sz="half" idx="15"/>
+          </p:nvPr>
+        </p:nvSpPr>
+        <p:spPr>
+          <a:xfrm>
+            <a:off x="1341120" y="1969430"/>
+            <a:ext cx="6182535" cy="2924681"/>
+          </a:xfrm>
+        </p:spPr>
+        <p:txBody>
+          <a:bodyPr vert="horz" lIns="91440" tIns="0" rIns="91440" bIns="45720" rtlCol="0" anchor="t">
+            <a:normAutofit/>
+          </a:bodyPr>
+          <a:lstStyle/>
+          <a:p>
+            <a:pPr marL="283210" indent="-283210"/>
+            <a:r>
+              <a:rPr lang="en-US" dirty="0" err="1">
+                <a:ea typeface="+mn-lt"/>
+                <a:cs typeface="+mn-lt"/>
+              </a:rPr>
+              <a:t>ChromaDB</a:t>
+            </a:r>
+            <a:r>
+              <a:rPr lang="en-US" dirty="0">
+                <a:ea typeface="+mn-lt"/>
+                <a:cs typeface="+mn-lt"/>
+              </a:rPr>
+              <a:t>, a special database that utilizes vector embeddings to efficiently search through the text chunks.</a:t>
+            </a:r>
+            <a:endParaRPr lang="en-US" dirty="0"/>
+          </a:p>
+        </p:txBody>
+      </p:sp>
+      <p:sp>
+        <p:nvSpPr>
+          <p:cNvPr id="68" name="Slide Number Placeholder 67">
+            <a:extLst>
+              <a:ext uri="{FF2B5EF4-FFF2-40B4-BE49-F238E27FC236}">
+                <a16:creationId xmlns:a16="http://schemas.microsoft.com/office/drawing/2014/main" id="{AA0ACADD-CC4E-851C-DA07-C22DB97FA23E}"/>
+              </a:ext>
+            </a:extLst>
+          </p:cNvPr>
+          <p:cNvSpPr>
+            <a:spLocks noGrp="1"/>
+          </p:cNvSpPr>
+          <p:nvPr>
+            <p:ph type="sldNum" sz="quarter" idx="13"/>
+          </p:nvPr>
+        </p:nvSpPr>
+        <p:spPr>
+          <a:xfrm>
+            <a:off x="10373350" y="6356349"/>
+            <a:ext cx="987552" cy="365125"/>
+          </a:xfrm>
+        </p:spPr>
+        <p:txBody>
+          <a:bodyPr/>
+          <a:lstStyle/>
+          <a:p>
+            <a:fld id="{A49DFD55-3C28-40EF-9E31-A92D2E4017FF}" type="slidenum">
+              <a:rPr lang="en-US" smtClean="0"/>
+              <a:pPr/>
+              <a:t>15</a:t>
+            </a:fld>
+            <a:endParaRPr lang="en-US" dirty="0"/>
+          </a:p>
+        </p:txBody>
+      </p:sp>
+      <p:pic>
+        <p:nvPicPr>
+          <p:cNvPr id="5" name="Picture 4" descr="A diagram of a product&#10;&#10;Description automatically generated">
+            <a:extLst>
+              <a:ext uri="{FF2B5EF4-FFF2-40B4-BE49-F238E27FC236}">
+                <a16:creationId xmlns:a16="http://schemas.microsoft.com/office/drawing/2014/main" id="{0C7AC10D-4A9E-B60C-8162-0EA72350D7F4}"/>
+              </a:ext>
+            </a:extLst>
+          </p:cNvPr>
+          <p:cNvPicPr>
+            <a:picLocks noChangeAspect="1"/>
+          </p:cNvPicPr>
+          <p:nvPr/>
+        </p:nvPicPr>
+        <p:blipFill>
+          <a:blip r:embed="rId3"/>
+          <a:stretch>
+            <a:fillRect/>
+          </a:stretch>
+        </p:blipFill>
+        <p:spPr>
+          <a:xfrm>
+            <a:off x="1342314" y="2983217"/>
+            <a:ext cx="9507371" cy="3225848"/>
+          </a:xfrm>
+          <a:prstGeom prst="rect">
+            <a:avLst/>
+          </a:prstGeom>
+        </p:spPr>
+      </p:pic>
+    </p:spTree>
+    <p:extLst>
+      <p:ext uri="{BB962C8B-B14F-4D97-AF65-F5344CB8AC3E}">
+        <p14:creationId xmlns:p14="http://schemas.microsoft.com/office/powerpoint/2010/main" val="2181802535"/>
+      </p:ext>
+    </p:extLst>
+  </p:cSld>
+  <p:clrMapOvr>
+    <a:masterClrMapping/>
+  </p:clrMapOvr>
+</p:sld>
+</file>
+
+<file path=ppt/slides/slide16.xml><?xml version="1.0" encoding="utf-8"?>
+<p:sld xmlns:a="http://schemas.openxmlformats.org/drawingml/2006/main" xmlns:r="http://schemas.openxmlformats.org/officeDocument/2006/relationships" xmlns:p="http://schemas.openxmlformats.org/presentationml/2006/main">
+  <p:cSld>
+    <p:spTree>
+      <p:nvGrpSpPr>
+        <p:cNvPr id="1" name=""/>
+        <p:cNvGrpSpPr/>
+        <p:nvPr/>
+      </p:nvGrpSpPr>
+      <p:grpSpPr>
+        <a:xfrm>
+          <a:off x="0" y="0"/>
+          <a:ext cx="0" cy="0"/>
+          <a:chOff x="0" y="0"/>
+          <a:chExt cx="0" cy="0"/>
+        </a:xfrm>
+      </p:grpSpPr>
+      <p:sp>
+        <p:nvSpPr>
+          <p:cNvPr id="2" name="Title 1">
+            <a:extLst>
+              <a:ext uri="{FF2B5EF4-FFF2-40B4-BE49-F238E27FC236}">
                 <a16:creationId xmlns:a16="http://schemas.microsoft.com/office/drawing/2014/main" id="{8BDF1EDE-5423-435C-B149-87AB1BC22B83}"/>
               </a:ext>
             </a:extLst>
@@ -8836,7 +9356,7 @@
             <a:fld id="{A49DFD55-3C28-40EF-9E31-A92D2E4017FF}" type="slidenum">
               <a:rPr lang="en-US" smtClean="0"/>
               <a:pPr/>
-              <a:t>15</a:t>
+              <a:t>16</a:t>
             </a:fld>
             <a:endParaRPr lang="en-US" dirty="0"/>
           </a:p>
@@ -9432,38 +9952,89 @@
           <p:cNvPr id="2" name="Title 1">
             <a:extLst>
               <a:ext uri="{FF2B5EF4-FFF2-40B4-BE49-F238E27FC236}">
-                <a16:creationId xmlns:a16="http://schemas.microsoft.com/office/drawing/2014/main" id="{566C97BE-403B-122E-90D1-2788978A0B6F}"/>
-              </a:ext>
-            </a:extLst>
-          </p:cNvPr>
-          <p:cNvSpPr>
-            <a:spLocks noGrp="1"/>
-          </p:cNvSpPr>
-          <p:nvPr>
-            <p:ph type="ctrTitle"/>
-          </p:nvPr>
-        </p:nvSpPr>
-        <p:spPr>
-          <a:xfrm>
-            <a:off x="6991350" y="406400"/>
-            <a:ext cx="4179570" cy="3457971"/>
-          </a:xfrm>
-        </p:spPr>
+                <a16:creationId xmlns:a16="http://schemas.microsoft.com/office/drawing/2014/main" id="{E012C735-CE5D-6533-7D7B-FB3544DA0455}"/>
+              </a:ext>
+            </a:extLst>
+          </p:cNvPr>
+          <p:cNvSpPr>
+            <a:spLocks noGrp="1"/>
+          </p:cNvSpPr>
+          <p:nvPr>
+            <p:ph type="title"/>
+          </p:nvPr>
+        </p:nvSpPr>
+        <p:spPr/>
         <p:txBody>
           <a:bodyPr/>
           <a:lstStyle/>
           <a:p>
-            <a:r>
-              <a:rPr lang="en-US" dirty="0"/>
-              <a:t>WHAT IS RAG ?</a:t>
-            </a:r>
-          </a:p>
-        </p:txBody>
-      </p:sp>
+            <a:endParaRPr lang="en-US"/>
+          </a:p>
+        </p:txBody>
+      </p:sp>
+      <p:sp>
+        <p:nvSpPr>
+          <p:cNvPr id="4" name="Slide Number Placeholder 3">
+            <a:extLst>
+              <a:ext uri="{FF2B5EF4-FFF2-40B4-BE49-F238E27FC236}">
+                <a16:creationId xmlns:a16="http://schemas.microsoft.com/office/drawing/2014/main" id="{F15C10A8-36C8-EE4A-B389-AEBB7E82DD55}"/>
+              </a:ext>
+            </a:extLst>
+          </p:cNvPr>
+          <p:cNvSpPr>
+            <a:spLocks noGrp="1"/>
+          </p:cNvSpPr>
+          <p:nvPr>
+            <p:ph type="sldNum" sz="quarter" idx="12"/>
+          </p:nvPr>
+        </p:nvSpPr>
+        <p:spPr/>
+        <p:txBody>
+          <a:bodyPr/>
+          <a:lstStyle/>
+          <a:p>
+            <a:fld id="{A49DFD55-3C28-40EF-9E31-A92D2E4017FF}" type="slidenum">
+              <a:rPr lang="en-US" smtClean="0"/>
+              <a:pPr/>
+              <a:t>5</a:t>
+            </a:fld>
+            <a:endParaRPr lang="en-US" dirty="0"/>
+          </a:p>
+        </p:txBody>
+      </p:sp>
+      <p:pic>
+        <p:nvPicPr>
+          <p:cNvPr id="8" name="Content Placeholder 7">
+            <a:extLst>
+              <a:ext uri="{FF2B5EF4-FFF2-40B4-BE49-F238E27FC236}">
+                <a16:creationId xmlns:a16="http://schemas.microsoft.com/office/drawing/2014/main" id="{E95B15D7-579C-E21F-4B04-9CCB85E4C68E}"/>
+              </a:ext>
+            </a:extLst>
+          </p:cNvPr>
+          <p:cNvPicPr>
+            <a:picLocks noGrp="1" noChangeAspect="1"/>
+          </p:cNvPicPr>
+          <p:nvPr>
+            <p:ph sz="half" idx="2"/>
+          </p:nvPr>
+        </p:nvPicPr>
+        <p:blipFill>
+          <a:blip r:embed="rId2"/>
+          <a:stretch>
+            <a:fillRect/>
+          </a:stretch>
+        </p:blipFill>
+        <p:spPr>
+          <a:xfrm>
+            <a:off x="1055537" y="666452"/>
+            <a:ext cx="9813676" cy="5519250"/>
+          </a:xfrm>
+        </p:spPr>
+      </p:pic>
     </p:spTree>
     <p:extLst>
       <p:ext uri="{BB962C8B-B14F-4D97-AF65-F5344CB8AC3E}">
-        <p14:creationId xmlns:p14="http://schemas.microsoft.com/office/powerpoint/2010/main" val="334696707"/>
+        <p14:creationId xmlns:p14="http://schemas.microsoft.com/office/powerpoint/2010/main" val="2821642946"/>
       </p:ext>
     </p:extLst>
   </p:cSld>
@@ -9495,6 +10066,69 @@
           <p:cNvPr id="2" name="Title 1">
             <a:extLst>
               <a:ext uri="{FF2B5EF4-FFF2-40B4-BE49-F238E27FC236}">
+                <a16:creationId xmlns:a16="http://schemas.microsoft.com/office/drawing/2014/main" id="{566C97BE-403B-122E-90D1-2788978A0B6F}"/>
+              </a:ext>
+            </a:extLst>
+          </p:cNvPr>
+          <p:cNvSpPr>
+            <a:spLocks noGrp="1"/>
+          </p:cNvSpPr>
+          <p:nvPr>
+            <p:ph type="ctrTitle"/>
+          </p:nvPr>
+        </p:nvSpPr>
+        <p:spPr>
+          <a:xfrm>
+            <a:off x="6991350" y="406400"/>
+            <a:ext cx="4179570" cy="3457971"/>
+          </a:xfrm>
+        </p:spPr>
+        <p:txBody>
+          <a:bodyPr/>
+          <a:lstStyle/>
+          <a:p>
+            <a:r>
+              <a:rPr lang="en-US" dirty="0"/>
+              <a:t>WHAT IS RAG ?</a:t>
+            </a:r>
+          </a:p>
+        </p:txBody>
+      </p:sp>
+    </p:spTree>
+    <p:extLst>
+      <p:ext uri="{BB962C8B-B14F-4D97-AF65-F5344CB8AC3E}">
+        <p14:creationId xmlns:p14="http://schemas.microsoft.com/office/powerpoint/2010/main" val="334696707"/>
+      </p:ext>
+    </p:extLst>
+  </p:cSld>
+  <p:clrMapOvr>
+    <a:masterClrMapping/>
+  </p:clrMapOvr>
+</p:sld>
+</file>
+
+<file path=ppt/slides/slide7.xml><?xml version="1.0" encoding="utf-8"?>
+<p:sld xmlns:a="http://schemas.openxmlformats.org/drawingml/2006/main" xmlns:r="http://schemas.openxmlformats.org/officeDocument/2006/relationships" xmlns:p="http://schemas.openxmlformats.org/presentationml/2006/main">
+  <p:cSld>
+    <p:spTree>
+      <p:nvGrpSpPr>
+        <p:cNvPr id="1" name=""/>
+        <p:cNvGrpSpPr/>
+        <p:nvPr/>
+      </p:nvGrpSpPr>
+      <p:grpSpPr>
+        <a:xfrm>
+          <a:off x="0" y="0"/>
+          <a:ext cx="0" cy="0"/>
+          <a:chOff x="0" y="0"/>
+          <a:chExt cx="0" cy="0"/>
+        </a:xfrm>
+      </p:grpSpPr>
+      <p:sp>
+        <p:nvSpPr>
+          <p:cNvPr id="2" name="Title 1">
+            <a:extLst>
+              <a:ext uri="{FF2B5EF4-FFF2-40B4-BE49-F238E27FC236}">
                 <a16:creationId xmlns:a16="http://schemas.microsoft.com/office/drawing/2014/main" id="{A95E2E6A-35EC-1B8E-0FD7-8C67870ACA64}"/>
               </a:ext>
             </a:extLst>
@@ -9709,7 +10343,7 @@
             <a:fld id="{A49DFD55-3C28-40EF-9E31-A92D2E4017FF}" type="slidenum">
               <a:rPr lang="en-US" smtClean="0"/>
               <a:pPr/>
-              <a:t>6</a:t>
+              <a:t>7</a:t>
             </a:fld>
             <a:endParaRPr lang="en-US" dirty="0"/>
           </a:p>
@@ -9912,7 +10546,7 @@
                 <a:ea typeface="+mn-lt"/>
                 <a:cs typeface="+mn-lt"/>
               </a:rPr>
-              <a:t>RAG stands for Retrieval-Augmented Generation, a cutting-edge approach in AI text generation that overcomes limitations of traditional methods.</a:t>
+              <a:t>RAG is a cutting-edge approach in AI text generation that overcomes limitations of traditional methods.</a:t>
             </a:r>
           </a:p>
           <a:p>
@@ -9954,6 +10588,52 @@
           </a:p>
         </p:txBody>
       </p:sp>
+      <p:pic>
+        <p:nvPicPr>
+          <p:cNvPr id="3" name="Picture 2" descr="How Does an Iceberg Really Float? – State of the Planet">
+            <a:extLst>
+              <a:ext uri="{FF2B5EF4-FFF2-40B4-BE49-F238E27FC236}">
+                <a16:creationId xmlns:a16="http://schemas.microsoft.com/office/drawing/2014/main" id="{5AC6DB03-1428-F275-5B99-AFCE8086C9D9}"/>
+              </a:ext>
+            </a:extLst>
+          </p:cNvPr>
+          <p:cNvPicPr>
+            <a:picLocks noChangeAspect="1"/>
+          </p:cNvPicPr>
+          <p:nvPr/>
+        </p:nvPicPr>
+        <p:blipFill>
+          <a:blip r:embed="rId3">
+            <a:alphaModFix amt="86000"/>
+            <a:extLst>
+              <a:ext uri="{BEBA8EAE-BF5A-486C-A8C5-ECC9F3942E4B}">
+                <a14:imgProps xmlns:a14="http://schemas.microsoft.com/office/drawing/2010/main">
+                  <a14:imgLayer r:embed="rId4">
+                    <a14:imgEffect>
+                      <a14:saturation sat="0"/>
+                    </a14:imgEffect>
+                    <a14:imgEffect>
+                      <a14:brightnessContrast bright="-21000" contrast="-4000"/>
+                    </a14:imgEffect>
+                  </a14:imgLayer>
+                </a14:imgProps>
+              </a:ext>
+            </a:extLst>
+          </a:blip>
+          <a:stretch>
+            <a:fillRect/>
+          </a:stretch>
+        </p:blipFill>
+        <p:spPr>
+          <a:xfrm>
+            <a:off x="1308" y="4888622"/>
+            <a:ext cx="1956955" cy="1966851"/>
+          </a:xfrm>
+          <a:prstGeom prst="rect">
+            <a:avLst/>
+          </a:prstGeom>
+        </p:spPr>
+      </p:pic>
     </p:spTree>
     <p:extLst>
       <p:ext uri="{BB962C8B-B14F-4D97-AF65-F5344CB8AC3E}">
@@ -9964,174 +10644,250 @@
   <p:clrMapOvr>
     <a:masterClrMapping/>
   </p:clrMapOvr>
-</p:sld>
-</file>
-
-<file path=ppt/slides/slide7.xml><?xml version="1.0" encoding="utf-8"?>
-<p:sld xmlns:a="http://schemas.openxmlformats.org/drawingml/2006/main" xmlns:r="http://schemas.openxmlformats.org/officeDocument/2006/relationships" xmlns:p="http://schemas.openxmlformats.org/presentationml/2006/main">
-  <p:cSld>
-    <p:spTree>
-      <p:nvGrpSpPr>
-        <p:cNvPr id="1" name=""/>
-        <p:cNvGrpSpPr/>
-        <p:nvPr/>
-      </p:nvGrpSpPr>
-      <p:grpSpPr>
-        <a:xfrm>
-          <a:off x="0" y="0"/>
-          <a:ext cx="0" cy="0"/>
-          <a:chOff x="0" y="0"/>
-          <a:chExt cx="0" cy="0"/>
-        </a:xfrm>
-      </p:grpSpPr>
-      <p:pic>
-        <p:nvPicPr>
-          <p:cNvPr id="8" name="Content Placeholder 7" descr="A screenshot of a computer&#10;&#10;Description automatically generated">
-            <a:extLst>
-              <a:ext uri="{FF2B5EF4-FFF2-40B4-BE49-F238E27FC236}">
-                <a16:creationId xmlns:a16="http://schemas.microsoft.com/office/drawing/2014/main" id="{F3BB354D-8209-48C1-B39F-F9522292C312}"/>
-              </a:ext>
-            </a:extLst>
-          </p:cNvPr>
-          <p:cNvPicPr>
-            <a:picLocks noGrp="1" noChangeAspect="1"/>
-          </p:cNvPicPr>
-          <p:nvPr>
-            <p:ph sz="half" idx="13"/>
-          </p:nvPr>
-        </p:nvPicPr>
-        <p:blipFill>
-          <a:blip r:embed="rId2"/>
-          <a:stretch>
-            <a:fillRect/>
-          </a:stretch>
-        </p:blipFill>
-        <p:spPr>
-          <a:xfrm>
-            <a:off x="927975" y="3740"/>
-            <a:ext cx="7385764" cy="3520113"/>
-          </a:xfrm>
-        </p:spPr>
-      </p:pic>
-      <p:sp>
-        <p:nvSpPr>
-          <p:cNvPr id="7" name="Slide Number Placeholder 6">
-            <a:extLst>
-              <a:ext uri="{FF2B5EF4-FFF2-40B4-BE49-F238E27FC236}">
-                <a16:creationId xmlns:a16="http://schemas.microsoft.com/office/drawing/2014/main" id="{C4DE179D-F19D-B872-2DEB-CECBB15AFBCD}"/>
-              </a:ext>
-            </a:extLst>
-          </p:cNvPr>
-          <p:cNvSpPr>
-            <a:spLocks noGrp="1"/>
-          </p:cNvSpPr>
-          <p:nvPr>
-            <p:ph type="sldNum" sz="quarter" idx="12"/>
-          </p:nvPr>
-        </p:nvSpPr>
-        <p:spPr/>
-        <p:txBody>
-          <a:bodyPr/>
-          <a:lstStyle/>
-          <a:p>
-            <a:fld id="{A49DFD55-3C28-40EF-9E31-A92D2E4017FF}" type="slidenum">
-              <a:rPr lang="en-US" smtClean="0"/>
-              <a:pPr/>
-              <a:t>7</a:t>
-            </a:fld>
-            <a:endParaRPr lang="en-US" dirty="0"/>
-          </a:p>
-        </p:txBody>
-      </p:sp>
-      <p:pic>
-        <p:nvPicPr>
-          <p:cNvPr id="9" name="Picture 8">
-            <a:extLst>
-              <a:ext uri="{FF2B5EF4-FFF2-40B4-BE49-F238E27FC236}">
-                <a16:creationId xmlns:a16="http://schemas.microsoft.com/office/drawing/2014/main" id="{770FE97F-80CD-C9E6-CE38-FA07525C29D7}"/>
-              </a:ext>
-            </a:extLst>
-          </p:cNvPr>
-          <p:cNvPicPr>
-            <a:picLocks noChangeAspect="1"/>
-          </p:cNvPicPr>
-          <p:nvPr/>
-        </p:nvPicPr>
-        <p:blipFill>
-          <a:blip r:embed="rId3"/>
-          <a:stretch>
-            <a:fillRect/>
-          </a:stretch>
-        </p:blipFill>
-        <p:spPr>
-          <a:xfrm>
-            <a:off x="3853791" y="3510310"/>
-            <a:ext cx="7383520" cy="3349583"/>
-          </a:xfrm>
-          <a:prstGeom prst="rect">
-            <a:avLst/>
-          </a:prstGeom>
-        </p:spPr>
-      </p:pic>
-      <p:sp>
-        <p:nvSpPr>
-          <p:cNvPr id="10" name="TextBox 9">
-            <a:extLst>
-              <a:ext uri="{FF2B5EF4-FFF2-40B4-BE49-F238E27FC236}">
-                <a16:creationId xmlns:a16="http://schemas.microsoft.com/office/drawing/2014/main" id="{18E030E3-8B06-6221-63D1-58F86EEC4082}"/>
-              </a:ext>
-            </a:extLst>
-          </p:cNvPr>
-          <p:cNvSpPr txBox="1"/>
-          <p:nvPr/>
-        </p:nvSpPr>
-        <p:spPr>
-          <a:xfrm>
-            <a:off x="6095999" y="6577724"/>
-            <a:ext cx="8777888" cy="276999"/>
-          </a:xfrm>
-          <a:prstGeom prst="rect">
-            <a:avLst/>
-          </a:prstGeom>
-          <a:noFill/>
-        </p:spPr>
-        <p:txBody>
-          <a:bodyPr rot="0" spcFirstLastPara="0" vertOverflow="overflow" horzOverflow="overflow" vert="horz" wrap="square" lIns="91440" tIns="45720" rIns="91440" bIns="45720" numCol="1" spcCol="0" rtlCol="0" fromWordArt="0" anchor="t" anchorCtr="0" forceAA="0" compatLnSpc="1">
-            <a:prstTxWarp prst="textNoShape">
-              <a:avLst/>
-            </a:prstTxWarp>
-            <a:spAutoFit/>
-          </a:bodyPr>
-          <a:lstStyle/>
-          <a:p>
-            <a:r>
-              <a:rPr lang="en-US" sz="1200" dirty="0">
-                <a:solidFill>
-                  <a:srgbClr val="000000"/>
-                </a:solidFill>
-                <a:ea typeface="+mn-lt"/>
-                <a:cs typeface="+mn-lt"/>
-              </a:rPr>
-              <a:t>Source : https://python.langchain.com/docs/use_cases/question_answering/</a:t>
-            </a:r>
-            <a:endParaRPr lang="en-US" sz="1200">
-              <a:solidFill>
-                <a:srgbClr val="000000"/>
-              </a:solidFill>
-            </a:endParaRPr>
-          </a:p>
-        </p:txBody>
-      </p:sp>
-    </p:spTree>
-    <p:extLst>
-      <p:ext uri="{BB962C8B-B14F-4D97-AF65-F5344CB8AC3E}">
-        <p14:creationId xmlns:p14="http://schemas.microsoft.com/office/powerpoint/2010/main" val="231058066"/>
-      </p:ext>
-    </p:extLst>
-  </p:cSld>
-  <p:clrMapOvr>
-    <a:masterClrMapping/>
-  </p:clrMapOvr>
+  <p:timing>
+    <p:tnLst>
+      <p:par>
+        <p:cTn id="1" dur="indefinite" restart="never" nodeType="tmRoot">
+          <p:childTnLst>
+            <p:seq concurrent="1" nextAc="seek">
+              <p:cTn id="2" dur="indefinite" nodeType="mainSeq">
+                <p:childTnLst>
+                  <p:par>
+                    <p:cTn id="3" fill="hold">
+                      <p:stCondLst>
+                        <p:cond delay="indefinite"/>
+                      </p:stCondLst>
+                      <p:childTnLst>
+                        <p:par>
+                          <p:cTn id="4" fill="hold">
+                            <p:stCondLst>
+                              <p:cond delay="0"/>
+                            </p:stCondLst>
+                            <p:childTnLst>
+                              <p:par>
+                                <p:cTn id="5" presetID="10" presetClass="entr" presetSubtype="0" fill="hold" grpId="0" nodeType="clickEffect">
+                                  <p:stCondLst>
+                                    <p:cond delay="0"/>
+                                  </p:stCondLst>
+                                  <p:childTnLst>
+                                    <p:set>
+                                      <p:cBhvr>
+                                        <p:cTn id="6" dur="1" fill="hold">
+                                          <p:stCondLst>
+                                            <p:cond delay="0"/>
+                                          </p:stCondLst>
+                                        </p:cTn>
+                                        <p:tgtEl>
+                                          <p:spTgt spid="12">
+                                            <p:txEl>
+                                              <p:pRg st="0" end="0"/>
+                                            </p:txEl>
+                                          </p:spTgt>
+                                        </p:tgtEl>
+                                        <p:attrNameLst>
+                                          <p:attrName>style.visibility</p:attrName>
+                                        </p:attrNameLst>
+                                      </p:cBhvr>
+                                      <p:to>
+                                        <p:strVal val="visible"/>
+                                      </p:to>
+                                    </p:set>
+                                    <p:animEffect transition="in" filter="fade">
+                                      <p:cBhvr>
+                                        <p:cTn id="7" dur="500"/>
+                                        <p:tgtEl>
+                                          <p:spTgt spid="12">
+                                            <p:txEl>
+                                              <p:pRg st="0" end="0"/>
+                                            </p:txEl>
+                                          </p:spTgt>
+                                        </p:tgtEl>
+                                      </p:cBhvr>
+                                    </p:animEffect>
+                                  </p:childTnLst>
+                                </p:cTn>
+                              </p:par>
+                              <p:par>
+                                <p:cTn id="8" presetID="10" presetClass="entr" presetSubtype="0" fill="hold" grpId="0" nodeType="withEffect">
+                                  <p:stCondLst>
+                                    <p:cond delay="0"/>
+                                  </p:stCondLst>
+                                  <p:childTnLst>
+                                    <p:set>
+                                      <p:cBhvr>
+                                        <p:cTn id="9" dur="1" fill="hold">
+                                          <p:stCondLst>
+                                            <p:cond delay="0"/>
+                                          </p:stCondLst>
+                                        </p:cTn>
+                                        <p:tgtEl>
+                                          <p:spTgt spid="35">
+                                            <p:txEl>
+                                              <p:pRg st="0" end="0"/>
+                                            </p:txEl>
+                                          </p:spTgt>
+                                        </p:tgtEl>
+                                        <p:attrNameLst>
+                                          <p:attrName>style.visibility</p:attrName>
+                                        </p:attrNameLst>
+                                      </p:cBhvr>
+                                      <p:to>
+                                        <p:strVal val="visible"/>
+                                      </p:to>
+                                    </p:set>
+                                    <p:animEffect transition="in" filter="fade">
+                                      <p:cBhvr>
+                                        <p:cTn id="10" dur="500"/>
+                                        <p:tgtEl>
+                                          <p:spTgt spid="35">
+                                            <p:txEl>
+                                              <p:pRg st="0" end="0"/>
+                                            </p:txEl>
+                                          </p:spTgt>
+                                        </p:tgtEl>
+                                      </p:cBhvr>
+                                    </p:animEffect>
+                                  </p:childTnLst>
+                                </p:cTn>
+                              </p:par>
+                            </p:childTnLst>
+                          </p:cTn>
+                        </p:par>
+                      </p:childTnLst>
+                    </p:cTn>
+                  </p:par>
+                  <p:par>
+                    <p:cTn id="11" fill="hold">
+                      <p:stCondLst>
+                        <p:cond delay="indefinite"/>
+                      </p:stCondLst>
+                      <p:childTnLst>
+                        <p:par>
+                          <p:cTn id="12" fill="hold">
+                            <p:stCondLst>
+                              <p:cond delay="0"/>
+                            </p:stCondLst>
+                            <p:childTnLst>
+                              <p:par>
+                                <p:cTn id="13" presetID="10" presetClass="entr" presetSubtype="0" fill="hold" grpId="0" nodeType="clickEffect">
+                                  <p:stCondLst>
+                                    <p:cond delay="0"/>
+                                  </p:stCondLst>
+                                  <p:childTnLst>
+                                    <p:set>
+                                      <p:cBhvr>
+                                        <p:cTn id="14" dur="1" fill="hold">
+                                          <p:stCondLst>
+                                            <p:cond delay="0"/>
+                                          </p:stCondLst>
+                                        </p:cTn>
+                                        <p:tgtEl>
+                                          <p:spTgt spid="14">
+                                            <p:txEl>
+                                              <p:pRg st="0" end="0"/>
+                                            </p:txEl>
+                                          </p:spTgt>
+                                        </p:tgtEl>
+                                        <p:attrNameLst>
+                                          <p:attrName>style.visibility</p:attrName>
+                                        </p:attrNameLst>
+                                      </p:cBhvr>
+                                      <p:to>
+                                        <p:strVal val="visible"/>
+                                      </p:to>
+                                    </p:set>
+                                    <p:animEffect transition="in" filter="fade">
+                                      <p:cBhvr>
+                                        <p:cTn id="15" dur="500"/>
+                                        <p:tgtEl>
+                                          <p:spTgt spid="14">
+                                            <p:txEl>
+                                              <p:pRg st="0" end="0"/>
+                                            </p:txEl>
+                                          </p:spTgt>
+                                        </p:tgtEl>
+                                      </p:cBhvr>
+                                    </p:animEffect>
+                                  </p:childTnLst>
+                                </p:cTn>
+                              </p:par>
+                              <p:par>
+                                <p:cTn id="16" presetID="10" presetClass="entr" presetSubtype="0" fill="hold" grpId="0" nodeType="withEffect">
+                                  <p:stCondLst>
+                                    <p:cond delay="0"/>
+                                  </p:stCondLst>
+                                  <p:childTnLst>
+                                    <p:set>
+                                      <p:cBhvr>
+                                        <p:cTn id="17" dur="1" fill="hold">
+                                          <p:stCondLst>
+                                            <p:cond delay="0"/>
+                                          </p:stCondLst>
+                                        </p:cTn>
+                                        <p:tgtEl>
+                                          <p:spTgt spid="50">
+                                            <p:txEl>
+                                              <p:pRg st="0" end="0"/>
+                                            </p:txEl>
+                                          </p:spTgt>
+                                        </p:tgtEl>
+                                        <p:attrNameLst>
+                                          <p:attrName>style.visibility</p:attrName>
+                                        </p:attrNameLst>
+                                      </p:cBhvr>
+                                      <p:to>
+                                        <p:strVal val="visible"/>
+                                      </p:to>
+                                    </p:set>
+                                    <p:animEffect transition="in" filter="fade">
+                                      <p:cBhvr>
+                                        <p:cTn id="18" dur="500"/>
+                                        <p:tgtEl>
+                                          <p:spTgt spid="50">
+                                            <p:txEl>
+                                              <p:pRg st="0" end="0"/>
+                                            </p:txEl>
+                                          </p:spTgt>
+                                        </p:tgtEl>
+                                      </p:cBhvr>
+                                    </p:animEffect>
+                                  </p:childTnLst>
+                                </p:cTn>
+                              </p:par>
+                            </p:childTnLst>
+                          </p:cTn>
+                        </p:par>
+                      </p:childTnLst>
+                    </p:cTn>
+                  </p:par>
+                </p:childTnLst>
+              </p:cTn>
+              <p:prevCondLst>
+                <p:cond evt="onPrev" delay="0">
+                  <p:tgtEl>
+                    <p:sldTgt/>
+                  </p:tgtEl>
+                </p:cond>
+              </p:prevCondLst>
+              <p:nextCondLst>
+                <p:cond evt="onNext" delay="0">
+                  <p:tgtEl>
+                    <p:sldTgt/>
+                  </p:tgtEl>
+                </p:cond>
+              </p:nextCondLst>
+            </p:seq>
+          </p:childTnLst>
+        </p:cTn>
+      </p:par>
+    </p:tnLst>
+    <p:bldLst>
+      <p:bldP spid="12" grpId="0" build="p"/>
+      <p:bldP spid="35" grpId="0" build="p"/>
+      <p:bldP spid="14" grpId="0" build="p"/>
+      <p:bldP spid="50" grpId="0" build="p"/>
+    </p:bldLst>
+  </p:timing>
 </p:sld>
 </file>
 
@@ -10152,188 +10908,53 @@
           <a:chExt cx="0" cy="0"/>
         </a:xfrm>
       </p:grpSpPr>
-      <p:sp>
-        <p:nvSpPr>
-          <p:cNvPr id="2" name="Title 1">
-            <a:extLst>
-              <a:ext uri="{FF2B5EF4-FFF2-40B4-BE49-F238E27FC236}">
-                <a16:creationId xmlns:a16="http://schemas.microsoft.com/office/drawing/2014/main" id="{0A32731C-311B-46F7-A865-6C3AF6B09A47}"/>
-              </a:ext>
-            </a:extLst>
-          </p:cNvPr>
-          <p:cNvSpPr>
-            <a:spLocks noGrp="1"/>
-          </p:cNvSpPr>
-          <p:nvPr>
-            <p:ph type="title"/>
-          </p:nvPr>
-        </p:nvSpPr>
-        <p:spPr>
-          <a:xfrm>
-            <a:off x="1322318" y="268360"/>
-            <a:ext cx="7288282" cy="2121177"/>
-          </a:xfrm>
-        </p:spPr>
-        <p:txBody>
-          <a:bodyPr/>
-          <a:lstStyle/>
-          <a:p>
-            <a:r>
-              <a:rPr lang="en-US" b="1">
-                <a:ea typeface="+mj-lt"/>
-                <a:cs typeface="+mj-lt"/>
-              </a:rPr>
-              <a:t>Benefits</a:t>
-            </a:r>
-            <a:endParaRPr lang="en-US"/>
-          </a:p>
-        </p:txBody>
-      </p:sp>
-      <p:sp>
-        <p:nvSpPr>
-          <p:cNvPr id="3" name="Text Placeholder 2">
-            <a:extLst>
-              <a:ext uri="{FF2B5EF4-FFF2-40B4-BE49-F238E27FC236}">
-                <a16:creationId xmlns:a16="http://schemas.microsoft.com/office/drawing/2014/main" id="{9D5232F9-FD00-464A-9F17-619C91AEF8F3}"/>
-              </a:ext>
-            </a:extLst>
-          </p:cNvPr>
-          <p:cNvSpPr>
-            <a:spLocks noGrp="1"/>
-          </p:cNvSpPr>
-          <p:nvPr>
-            <p:ph sz="half" idx="2"/>
-          </p:nvPr>
-        </p:nvSpPr>
-        <p:spPr>
-          <a:xfrm>
-            <a:off x="1085905" y="2754319"/>
-            <a:ext cx="7288212" cy="3407051"/>
-          </a:xfrm>
-        </p:spPr>
-        <p:txBody>
-          <a:bodyPr vert="horz" lIns="91440" tIns="45720" rIns="91440" bIns="45720" rtlCol="0" anchor="t">
-            <a:normAutofit fontScale="92500" lnSpcReduction="10000"/>
-          </a:bodyPr>
-          <a:lstStyle/>
-          <a:p>
-            <a:r>
-              <a:rPr lang="en-US" dirty="0">
-                <a:ea typeface="+mn-lt"/>
-                <a:cs typeface="+mn-lt"/>
-              </a:rPr>
-              <a:t> Improved Accuracy and Factual Grounding:</a:t>
-            </a:r>
-            <a:r>
-              <a:rPr lang="en-US" b="0" dirty="0">
-                <a:ea typeface="+mn-lt"/>
-                <a:cs typeface="+mn-lt"/>
-              </a:rPr>
-              <a:t> </a:t>
-            </a:r>
-            <a:endParaRPr lang="en-US"/>
-          </a:p>
-          <a:p>
-            <a:pPr marL="283210" lvl="1" indent="0">
-              <a:buNone/>
-            </a:pPr>
-            <a:r>
-              <a:rPr lang="en-US" dirty="0">
-                <a:ea typeface="+mn-lt"/>
-                <a:cs typeface="+mn-lt"/>
-              </a:rPr>
-              <a:t>By incorporating external knowledge, RAG reduces factual inconsistencies and hallucinations commonly seen in LLM-generated text.</a:t>
-            </a:r>
-            <a:endParaRPr lang="en-US" b="1" dirty="0">
-              <a:ea typeface="+mn-lt"/>
-              <a:cs typeface="+mn-lt"/>
-            </a:endParaRPr>
-          </a:p>
-          <a:p>
-            <a:pPr marL="283210" lvl="1" indent="0">
-              <a:buNone/>
-            </a:pPr>
-            <a:r>
-              <a:rPr lang="en-US" b="1" dirty="0">
-                <a:ea typeface="+mn-lt"/>
-                <a:cs typeface="+mn-lt"/>
-              </a:rPr>
-              <a:t>Enhanced Coherence and Focus: </a:t>
-            </a:r>
-            <a:endParaRPr lang="en-US" b="1" dirty="0"/>
-          </a:p>
-          <a:p>
-            <a:pPr marL="283210" lvl="1" indent="0">
-              <a:buNone/>
-            </a:pPr>
-            <a:r>
-              <a:rPr lang="en-US">
-                <a:ea typeface="+mn-lt"/>
-                <a:cs typeface="+mn-lt"/>
-              </a:rPr>
-              <a:t>The retrieved information helps RAG stay on topic and generate more coherent and focused text aligned with the user's intent.</a:t>
-            </a:r>
-          </a:p>
-          <a:p>
-            <a:pPr marL="285750">
-              <a:buFont typeface="Arial"/>
-            </a:pPr>
-            <a:r>
-              <a:rPr lang="en-US" dirty="0">
-                <a:ea typeface="+mn-lt"/>
-                <a:cs typeface="+mn-lt"/>
-              </a:rPr>
-              <a:t>Adaptability to Specific Domains</a:t>
-            </a:r>
-            <a:r>
-              <a:rPr lang="en-US" b="1" dirty="0">
-                <a:ea typeface="+mn-lt"/>
-                <a:cs typeface="+mn-lt"/>
-              </a:rPr>
-              <a:t>:</a:t>
-            </a:r>
-            <a:r>
-              <a:rPr lang="en-US" dirty="0">
-                <a:ea typeface="+mn-lt"/>
-                <a:cs typeface="+mn-lt"/>
-              </a:rPr>
-              <a:t> </a:t>
-            </a:r>
-            <a:endParaRPr lang="en-US"/>
-          </a:p>
-          <a:p>
-            <a:pPr marL="283210" lvl="1" indent="0">
-              <a:buNone/>
-            </a:pPr>
-            <a:r>
-              <a:rPr lang="en-US" dirty="0">
-                <a:ea typeface="+mn-lt"/>
-                <a:cs typeface="+mn-lt"/>
-              </a:rPr>
-              <a:t>RAG can be tailored to specific domains by using relevant knowledge sources, leading to more specialized and accurate text generation.</a:t>
-            </a:r>
-          </a:p>
-          <a:p>
-            <a:endParaRPr lang="en-US" dirty="0">
-              <a:ea typeface="+mn-lt"/>
-              <a:cs typeface="+mn-lt"/>
-            </a:endParaRPr>
-          </a:p>
-          <a:p>
-            <a:pPr marL="283210" lvl="1"/>
-            <a:endParaRPr lang="en-US" dirty="0">
-              <a:ea typeface="+mn-lt"/>
-              <a:cs typeface="+mn-lt"/>
-            </a:endParaRPr>
-          </a:p>
-        </p:txBody>
-      </p:sp>
-      <p:sp>
-        <p:nvSpPr>
-          <p:cNvPr id="14" name="Slide Number Placeholder 5">
-            <a:extLst>
-              <a:ext uri="{FF2B5EF4-FFF2-40B4-BE49-F238E27FC236}">
-                <a16:creationId xmlns:a16="http://schemas.microsoft.com/office/drawing/2014/main" id="{ECE635A2-70B8-3EAB-6A18-952B02EBAA1E}"/>
+      <p:pic>
+        <p:nvPicPr>
+          <p:cNvPr id="8" name="Content Placeholder 7" descr="A screenshot of a computer&#10;&#10;Description automatically generated">
+            <a:extLst>
+              <a:ext uri="{FF2B5EF4-FFF2-40B4-BE49-F238E27FC236}">
+                <a16:creationId xmlns:a16="http://schemas.microsoft.com/office/drawing/2014/main" id="{F3BB354D-8209-48C1-B39F-F9522292C312}"/>
+              </a:ext>
+            </a:extLst>
+          </p:cNvPr>
+          <p:cNvPicPr>
+            <a:picLocks noGrp="1" noChangeAspect="1"/>
+          </p:cNvPicPr>
+          <p:nvPr>
+            <p:ph sz="half" idx="13"/>
+          </p:nvPr>
+        </p:nvPicPr>
+        <p:blipFill>
+          <a:blip r:embed="rId3">
+            <a:extLst>
+              <a:ext uri="{BEBA8EAE-BF5A-486C-A8C5-ECC9F3942E4B}">
+                <a14:imgProps xmlns:a14="http://schemas.microsoft.com/office/drawing/2010/main">
+                  <a14:imgLayer r:embed="rId4">
+                    <a14:imgEffect>
+                      <a14:saturation sat="0"/>
+                    </a14:imgEffect>
+                  </a14:imgLayer>
+                </a14:imgProps>
+              </a:ext>
+            </a:extLst>
+          </a:blip>
+          <a:stretch>
+            <a:fillRect/>
+          </a:stretch>
+        </p:blipFill>
+        <p:spPr>
+          <a:xfrm>
+            <a:off x="927975" y="3740"/>
+            <a:ext cx="7385764" cy="3520113"/>
+          </a:xfrm>
+        </p:spPr>
+      </p:pic>
+      <p:sp>
+        <p:nvSpPr>
+          <p:cNvPr id="7" name="Slide Number Placeholder 6">
+            <a:extLst>
+              <a:ext uri="{FF2B5EF4-FFF2-40B4-BE49-F238E27FC236}">
+                <a16:creationId xmlns:a16="http://schemas.microsoft.com/office/drawing/2014/main" id="{C4DE179D-F19D-B872-2DEB-CECBB15AFBCD}"/>
               </a:ext>
             </a:extLst>
           </p:cNvPr>
@@ -10344,12 +10965,7 @@
             <p:ph type="sldNum" sz="quarter" idx="12"/>
           </p:nvPr>
         </p:nvSpPr>
-        <p:spPr>
-          <a:xfrm>
-            <a:off x="10373350" y="6356349"/>
-            <a:ext cx="987552" cy="365125"/>
-          </a:xfrm>
-        </p:spPr>
+        <p:spPr/>
         <p:txBody>
           <a:bodyPr/>
           <a:lstStyle/>
@@ -10363,16 +10979,243 @@
           </a:p>
         </p:txBody>
       </p:sp>
+      <p:pic>
+        <p:nvPicPr>
+          <p:cNvPr id="9" name="Picture 8">
+            <a:extLst>
+              <a:ext uri="{FF2B5EF4-FFF2-40B4-BE49-F238E27FC236}">
+                <a16:creationId xmlns:a16="http://schemas.microsoft.com/office/drawing/2014/main" id="{770FE97F-80CD-C9E6-CE38-FA07525C29D7}"/>
+              </a:ext>
+            </a:extLst>
+          </p:cNvPr>
+          <p:cNvPicPr>
+            <a:picLocks noChangeAspect="1"/>
+          </p:cNvPicPr>
+          <p:nvPr/>
+        </p:nvPicPr>
+        <p:blipFill>
+          <a:blip r:embed="rId5">
+            <a:extLst>
+              <a:ext uri="{BEBA8EAE-BF5A-486C-A8C5-ECC9F3942E4B}">
+                <a14:imgProps xmlns:a14="http://schemas.microsoft.com/office/drawing/2010/main">
+                  <a14:imgLayer r:embed="rId6">
+                    <a14:imgEffect>
+                      <a14:saturation sat="0"/>
+                    </a14:imgEffect>
+                  </a14:imgLayer>
+                </a14:imgProps>
+              </a:ext>
+            </a:extLst>
+          </a:blip>
+          <a:stretch>
+            <a:fillRect/>
+          </a:stretch>
+        </p:blipFill>
+        <p:spPr>
+          <a:xfrm>
+            <a:off x="3853791" y="3510310"/>
+            <a:ext cx="7383520" cy="3349583"/>
+          </a:xfrm>
+          <a:prstGeom prst="rect">
+            <a:avLst/>
+          </a:prstGeom>
+        </p:spPr>
+      </p:pic>
+      <p:sp>
+        <p:nvSpPr>
+          <p:cNvPr id="10" name="TextBox 9">
+            <a:extLst>
+              <a:ext uri="{FF2B5EF4-FFF2-40B4-BE49-F238E27FC236}">
+                <a16:creationId xmlns:a16="http://schemas.microsoft.com/office/drawing/2014/main" id="{18E030E3-8B06-6221-63D1-58F86EEC4082}"/>
+              </a:ext>
+            </a:extLst>
+          </p:cNvPr>
+          <p:cNvSpPr txBox="1"/>
+          <p:nvPr/>
+        </p:nvSpPr>
+        <p:spPr>
+          <a:xfrm>
+            <a:off x="6095999" y="6577724"/>
+            <a:ext cx="8777888" cy="276999"/>
+          </a:xfrm>
+          <a:prstGeom prst="rect">
+            <a:avLst/>
+          </a:prstGeom>
+          <a:noFill/>
+        </p:spPr>
+        <p:txBody>
+          <a:bodyPr rot="0" spcFirstLastPara="0" vertOverflow="overflow" horzOverflow="overflow" vert="horz" wrap="square" lIns="91440" tIns="45720" rIns="91440" bIns="45720" numCol="1" spcCol="0" rtlCol="0" fromWordArt="0" anchor="t" anchorCtr="0" forceAA="0" compatLnSpc="1">
+            <a:prstTxWarp prst="textNoShape">
+              <a:avLst/>
+            </a:prstTxWarp>
+            <a:spAutoFit/>
+          </a:bodyPr>
+          <a:lstStyle/>
+          <a:p>
+            <a:r>
+              <a:rPr lang="en-US" sz="1200" dirty="0">
+                <a:solidFill>
+                  <a:srgbClr val="000000"/>
+                </a:solidFill>
+                <a:ea typeface="+mn-lt"/>
+                <a:cs typeface="+mn-lt"/>
+              </a:rPr>
+              <a:t>Source : https://python.langchain.com/docs/use_cases/question_answering/</a:t>
+            </a:r>
+            <a:endParaRPr lang="en-US" sz="1200">
+              <a:solidFill>
+                <a:srgbClr val="000000"/>
+              </a:solidFill>
+            </a:endParaRPr>
+          </a:p>
+        </p:txBody>
+      </p:sp>
     </p:spTree>
     <p:extLst>
       <p:ext uri="{BB962C8B-B14F-4D97-AF65-F5344CB8AC3E}">
-        <p14:creationId xmlns:p14="http://schemas.microsoft.com/office/powerpoint/2010/main" val="2155047421"/>
+        <p14:creationId xmlns:p14="http://schemas.microsoft.com/office/powerpoint/2010/main" val="231058066"/>
       </p:ext>
     </p:extLst>
   </p:cSld>
   <p:clrMapOvr>
     <a:masterClrMapping/>
   </p:clrMapOvr>
+  <p:timing>
+    <p:tnLst>
+      <p:par>
+        <p:cTn id="1" dur="indefinite" restart="never" nodeType="tmRoot">
+          <p:childTnLst>
+            <p:seq concurrent="1" nextAc="seek">
+              <p:cTn id="2" dur="indefinite" nodeType="mainSeq">
+                <p:childTnLst>
+                  <p:par>
+                    <p:cTn id="3" fill="hold">
+                      <p:stCondLst>
+                        <p:cond delay="indefinite"/>
+                      </p:stCondLst>
+                      <p:childTnLst>
+                        <p:par>
+                          <p:cTn id="4" fill="hold">
+                            <p:stCondLst>
+                              <p:cond delay="0"/>
+                            </p:stCondLst>
+                            <p:childTnLst>
+                              <p:par>
+                                <p:cTn id="5" presetID="10" presetClass="entr" presetSubtype="0" fill="hold" nodeType="clickEffect">
+                                  <p:stCondLst>
+                                    <p:cond delay="0"/>
+                                  </p:stCondLst>
+                                  <p:childTnLst>
+                                    <p:set>
+                                      <p:cBhvr>
+                                        <p:cTn id="6" dur="1" fill="hold">
+                                          <p:stCondLst>
+                                            <p:cond delay="0"/>
+                                          </p:stCondLst>
+                                        </p:cTn>
+                                        <p:tgtEl>
+                                          <p:spTgt spid="8"/>
+                                        </p:tgtEl>
+                                        <p:attrNameLst>
+                                          <p:attrName>style.visibility</p:attrName>
+                                        </p:attrNameLst>
+                                      </p:cBhvr>
+                                      <p:to>
+                                        <p:strVal val="visible"/>
+                                      </p:to>
+                                    </p:set>
+                                    <p:animEffect transition="in" filter="fade">
+                                      <p:cBhvr>
+                                        <p:cTn id="7" dur="500"/>
+                                        <p:tgtEl>
+                                          <p:spTgt spid="8"/>
+                                        </p:tgtEl>
+                                      </p:cBhvr>
+                                    </p:animEffect>
+                                  </p:childTnLst>
+                                </p:cTn>
+                              </p:par>
+                            </p:childTnLst>
+                          </p:cTn>
+                        </p:par>
+                      </p:childTnLst>
+                    </p:cTn>
+                  </p:par>
+                  <p:par>
+                    <p:cTn id="8" fill="hold">
+                      <p:stCondLst>
+                        <p:cond delay="indefinite"/>
+                      </p:stCondLst>
+                      <p:childTnLst>
+                        <p:par>
+                          <p:cTn id="9" fill="hold">
+                            <p:stCondLst>
+                              <p:cond delay="0"/>
+                            </p:stCondLst>
+                            <p:childTnLst>
+                              <p:par>
+                                <p:cTn id="10" presetID="10" presetClass="entr" presetSubtype="0" fill="hold" nodeType="clickEffect">
+                                  <p:stCondLst>
+                                    <p:cond delay="0"/>
+                                  </p:stCondLst>
+                                  <p:childTnLst>
+                                    <p:set>
+                                      <p:cBhvr>
+                                        <p:cTn id="11" dur="1" fill="hold">
+                                          <p:stCondLst>
+                                            <p:cond delay="0"/>
+                                          </p:stCondLst>
+                                        </p:cTn>
+                                        <p:tgtEl>
+                                          <p:spTgt spid="9"/>
+                                        </p:tgtEl>
+                                        <p:attrNameLst>
+                                          <p:attrName>style.visibility</p:attrName>
+                                        </p:attrNameLst>
+                                      </p:cBhvr>
+                                      <p:to>
+                                        <p:strVal val="visible"/>
+                                      </p:to>
+                                    </p:set>
+                                    <p:animEffect transition="in" filter="fade">
+                                      <p:cBhvr>
+                                        <p:cTn id="12" dur="500"/>
+                                        <p:tgtEl>
+                                          <p:spTgt spid="9"/>
+                                        </p:tgtEl>
+                                      </p:cBhvr>
+                                    </p:animEffect>
+                                  </p:childTnLst>
+                                </p:cTn>
+                              </p:par>
+                            </p:childTnLst>
+                          </p:cTn>
+                        </p:par>
+                      </p:childTnLst>
+                    </p:cTn>
+                  </p:par>
+                </p:childTnLst>
+              </p:cTn>
+              <p:prevCondLst>
+                <p:cond evt="onPrev" delay="0">
+                  <p:tgtEl>
+                    <p:sldTgt/>
+                  </p:tgtEl>
+                </p:cond>
+              </p:prevCondLst>
+              <p:nextCondLst>
+                <p:cond evt="onNext" delay="0">
+                  <p:tgtEl>
+                    <p:sldTgt/>
+                  </p:tgtEl>
+                </p:cond>
+              </p:nextCondLst>
+            </p:seq>
+          </p:childTnLst>
+        </p:cTn>
+      </p:par>
+    </p:tnLst>
+  </p:timing>
 </p:sld>
 </file>
 
@@ -10398,21 +11241,21 @@
           <p:cNvPr id="2" name="Title 1">
             <a:extLst>
               <a:ext uri="{FF2B5EF4-FFF2-40B4-BE49-F238E27FC236}">
-                <a16:creationId xmlns:a16="http://schemas.microsoft.com/office/drawing/2014/main" id="{818AFA5E-469B-2BFC-9D4E-BD1EC6E48CA0}"/>
-              </a:ext>
-            </a:extLst>
-          </p:cNvPr>
-          <p:cNvSpPr>
-            <a:spLocks noGrp="1"/>
-          </p:cNvSpPr>
-          <p:nvPr>
-            <p:ph type="ctrTitle"/>
-          </p:nvPr>
-        </p:nvSpPr>
-        <p:spPr>
-          <a:xfrm>
-            <a:off x="6991350" y="487680"/>
-            <a:ext cx="4179570" cy="3376691"/>
+                <a16:creationId xmlns:a16="http://schemas.microsoft.com/office/drawing/2014/main" id="{0A32731C-311B-46F7-A865-6C3AF6B09A47}"/>
+              </a:ext>
+            </a:extLst>
+          </p:cNvPr>
+          <p:cNvSpPr>
+            <a:spLocks noGrp="1"/>
+          </p:cNvSpPr>
+          <p:nvPr>
+            <p:ph type="title"/>
+          </p:nvPr>
+        </p:nvSpPr>
+        <p:spPr>
+          <a:xfrm>
+            <a:off x="1322318" y="268360"/>
+            <a:ext cx="7288282" cy="2121177"/>
           </a:xfrm>
         </p:spPr>
         <p:txBody>
@@ -10420,80 +11263,194 @@
           <a:lstStyle/>
           <a:p>
             <a:r>
-              <a:rPr lang="en-US" b="1" dirty="0"/>
-              <a:t>RAG IN ACTION</a:t>
-            </a:r>
-          </a:p>
-        </p:txBody>
-      </p:sp>
-      <p:cxnSp>
-        <p:nvCxnSpPr>
-          <p:cNvPr id="21" name="Straight Connector 20">
-            <a:extLst>
-              <a:ext uri="{FF2B5EF4-FFF2-40B4-BE49-F238E27FC236}">
-                <a16:creationId xmlns:a16="http://schemas.microsoft.com/office/drawing/2014/main" id="{944268F6-A361-9907-F87F-9C4377ECAE6D}"/>
-              </a:ext>
-              <a:ext uri="{C183D7F6-B498-43B3-948B-1728B52AA6E4}">
-                <adec:decorative xmlns:adec="http://schemas.microsoft.com/office/drawing/2017/decorative" val="1"/>
-              </a:ext>
-            </a:extLst>
-          </p:cNvPr>
-          <p:cNvCxnSpPr>
-            <a:cxnSpLocks/>
-          </p:cNvCxnSpPr>
-          <p:nvPr/>
-        </p:nvCxnSpPr>
-        <p:spPr>
-          <a:xfrm flipH="1" flipV="1">
-            <a:off x="0" y="254643"/>
-            <a:ext cx="6096000" cy="855762"/>
-          </a:xfrm>
-          <a:prstGeom prst="line">
-            <a:avLst/>
-          </a:prstGeom>
-          <a:ln>
-            <a:solidFill>
-              <a:schemeClr val="bg1"/>
-            </a:solidFill>
-          </a:ln>
-        </p:spPr>
-        <p:style>
-          <a:lnRef idx="1">
-            <a:schemeClr val="accent1"/>
-          </a:lnRef>
-          <a:fillRef idx="0">
-            <a:schemeClr val="accent1"/>
-          </a:fillRef>
-          <a:effectRef idx="0">
-            <a:schemeClr val="accent1"/>
-          </a:effectRef>
-          <a:fontRef idx="minor">
-            <a:schemeClr val="tx1"/>
-          </a:fontRef>
-        </p:style>
-      </p:cxnSp>
-      <p:sp>
-        <p:nvSpPr>
-          <p:cNvPr id="4" name="Picture Placeholder 3">
-            <a:extLst>
-              <a:ext uri="{FF2B5EF4-FFF2-40B4-BE49-F238E27FC236}">
-                <a16:creationId xmlns:a16="http://schemas.microsoft.com/office/drawing/2014/main" id="{579CB9CA-F71D-D8D1-36A2-F52EAF935252}"/>
-              </a:ext>
-            </a:extLst>
-          </p:cNvPr>
-          <p:cNvSpPr>
-            <a:spLocks noGrp="1"/>
-          </p:cNvSpPr>
-          <p:nvPr>
-            <p:ph type="pic" sz="quarter" idx="10"/>
-          </p:nvPr>
-        </p:nvSpPr>
-        <p:spPr/>
+              <a:rPr lang="en-US" b="1">
+                <a:ea typeface="+mj-lt"/>
+                <a:cs typeface="+mj-lt"/>
+              </a:rPr>
+              <a:t>Benefits</a:t>
+            </a:r>
+            <a:endParaRPr lang="en-US"/>
+          </a:p>
+        </p:txBody>
+      </p:sp>
+      <p:sp>
+        <p:nvSpPr>
+          <p:cNvPr id="3" name="Text Placeholder 2">
+            <a:extLst>
+              <a:ext uri="{FF2B5EF4-FFF2-40B4-BE49-F238E27FC236}">
+                <a16:creationId xmlns:a16="http://schemas.microsoft.com/office/drawing/2014/main" id="{9D5232F9-FD00-464A-9F17-619C91AEF8F3}"/>
+              </a:ext>
+            </a:extLst>
+          </p:cNvPr>
+          <p:cNvSpPr>
+            <a:spLocks noGrp="1"/>
+          </p:cNvSpPr>
+          <p:nvPr>
+            <p:ph sz="half" idx="2"/>
+          </p:nvPr>
+        </p:nvSpPr>
+        <p:spPr>
+          <a:xfrm>
+            <a:off x="1085905" y="2754319"/>
+            <a:ext cx="7288212" cy="3407051"/>
+          </a:xfrm>
+        </p:spPr>
+        <p:txBody>
+          <a:bodyPr vert="horz" lIns="91440" tIns="45720" rIns="91440" bIns="45720" rtlCol="0" anchor="t">
+            <a:normAutofit fontScale="92500" lnSpcReduction="10000"/>
+          </a:bodyPr>
+          <a:lstStyle/>
+          <a:p>
+            <a:r>
+              <a:rPr lang="en-US" dirty="0">
+                <a:ea typeface="+mn-lt"/>
+                <a:cs typeface="+mn-lt"/>
+              </a:rPr>
+              <a:t> Improved Accuracy and Factual Grounding:</a:t>
+            </a:r>
+            <a:r>
+              <a:rPr lang="en-US" b="0" dirty="0">
+                <a:ea typeface="+mn-lt"/>
+                <a:cs typeface="+mn-lt"/>
+              </a:rPr>
+              <a:t> </a:t>
+            </a:r>
+            <a:endParaRPr lang="en-US"/>
+          </a:p>
+          <a:p>
+            <a:pPr marL="283210" lvl="1" indent="0">
+              <a:buNone/>
+            </a:pPr>
+            <a:r>
+              <a:rPr lang="en-US" dirty="0">
+                <a:ea typeface="+mn-lt"/>
+                <a:cs typeface="+mn-lt"/>
+              </a:rPr>
+              <a:t>By incorporating external knowledge, RAG reduces factual inconsistencies and hallucinations commonly seen in LLM-generated text.</a:t>
+            </a:r>
+            <a:endParaRPr lang="en-US" b="1" dirty="0">
+              <a:ea typeface="+mn-lt"/>
+              <a:cs typeface="+mn-lt"/>
+            </a:endParaRPr>
+          </a:p>
+          <a:p>
+            <a:pPr marL="283210" lvl="1" indent="0">
+              <a:buNone/>
+            </a:pPr>
+            <a:r>
+              <a:rPr lang="en-US" b="1" dirty="0">
+                <a:ea typeface="+mn-lt"/>
+                <a:cs typeface="+mn-lt"/>
+              </a:rPr>
+              <a:t>Enhanced Coherence and Focus: </a:t>
+            </a:r>
+            <a:endParaRPr lang="en-US" b="1" dirty="0"/>
+          </a:p>
+          <a:p>
+            <a:pPr marL="283210" lvl="1" indent="0">
+              <a:buNone/>
+            </a:pPr>
+            <a:r>
+              <a:rPr lang="en-US">
+                <a:ea typeface="+mn-lt"/>
+                <a:cs typeface="+mn-lt"/>
+              </a:rPr>
+              <a:t>The retrieved information helps RAG stay on topic and generate more coherent and focused text aligned with the user's intent.</a:t>
+            </a:r>
+          </a:p>
+          <a:p>
+            <a:pPr marL="285750">
+              <a:buFont typeface="Arial"/>
+            </a:pPr>
+            <a:r>
+              <a:rPr lang="en-US" dirty="0">
+                <a:ea typeface="+mn-lt"/>
+                <a:cs typeface="+mn-lt"/>
+              </a:rPr>
+              <a:t>Adaptability to Specific Domains</a:t>
+            </a:r>
+            <a:r>
+              <a:rPr lang="en-US" b="1" dirty="0">
+                <a:ea typeface="+mn-lt"/>
+                <a:cs typeface="+mn-lt"/>
+              </a:rPr>
+              <a:t>:</a:t>
+            </a:r>
+            <a:r>
+              <a:rPr lang="en-US" dirty="0">
+                <a:ea typeface="+mn-lt"/>
+                <a:cs typeface="+mn-lt"/>
+              </a:rPr>
+              <a:t> </a:t>
+            </a:r>
+            <a:endParaRPr lang="en-US"/>
+          </a:p>
+          <a:p>
+            <a:pPr marL="283210" lvl="1" indent="0">
+              <a:buNone/>
+            </a:pPr>
+            <a:r>
+              <a:rPr lang="en-US" dirty="0">
+                <a:ea typeface="+mn-lt"/>
+                <a:cs typeface="+mn-lt"/>
+              </a:rPr>
+              <a:t>RAG can be tailored to specific domains by using relevant knowledge sources, leading to more specialized and accurate text generation.</a:t>
+            </a:r>
+          </a:p>
+          <a:p>
+            <a:endParaRPr lang="en-US" dirty="0">
+              <a:ea typeface="+mn-lt"/>
+              <a:cs typeface="+mn-lt"/>
+            </a:endParaRPr>
+          </a:p>
+          <a:p>
+            <a:pPr marL="283210" lvl="1"/>
+            <a:endParaRPr lang="en-US" dirty="0">
+              <a:ea typeface="+mn-lt"/>
+              <a:cs typeface="+mn-lt"/>
+            </a:endParaRPr>
+          </a:p>
+        </p:txBody>
+      </p:sp>
+      <p:sp>
+        <p:nvSpPr>
+          <p:cNvPr id="14" name="Slide Number Placeholder 5">
+            <a:extLst>
+              <a:ext uri="{FF2B5EF4-FFF2-40B4-BE49-F238E27FC236}">
+                <a16:creationId xmlns:a16="http://schemas.microsoft.com/office/drawing/2014/main" id="{ECE635A2-70B8-3EAB-6A18-952B02EBAA1E}"/>
+              </a:ext>
+            </a:extLst>
+          </p:cNvPr>
+          <p:cNvSpPr>
+            <a:spLocks noGrp="1"/>
+          </p:cNvSpPr>
+          <p:nvPr>
+            <p:ph type="sldNum" sz="quarter" idx="12"/>
+          </p:nvPr>
+        </p:nvSpPr>
+        <p:spPr>
+          <a:xfrm>
+            <a:off x="10373350" y="6356349"/>
+            <a:ext cx="987552" cy="365125"/>
+          </a:xfrm>
+        </p:spPr>
+        <p:txBody>
+          <a:bodyPr/>
+          <a:lstStyle/>
+          <a:p>
+            <a:fld id="{A49DFD55-3C28-40EF-9E31-A92D2E4017FF}" type="slidenum">
+              <a:rPr lang="en-US" smtClean="0"/>
+              <a:pPr/>
+              <a:t>9</a:t>
+            </a:fld>
+            <a:endParaRPr lang="en-US" dirty="0"/>
+          </a:p>
+        </p:txBody>
       </p:sp>
     </p:spTree>
     <p:extLst>
       <p:ext uri="{BB962C8B-B14F-4D97-AF65-F5344CB8AC3E}">
-        <p14:creationId xmlns:p14="http://schemas.microsoft.com/office/powerpoint/2010/main" val="2471559769"/>
+        <p14:creationId xmlns:p14="http://schemas.microsoft.com/office/powerpoint/2010/main" val="2155047421"/>
       </p:ext>
     </p:extLst>
   </p:cSld>

</xml_diff>